<commit_message>
[WD A] Revisionata bozza presentazione, va integrata la matrice di tracciabilità dei design goals
</commit_message>
<xml_diff>
--- a/Presentazione/Atsilo1/Micco/Atsilo_A_Micco.pptx
+++ b/Presentazione/Atsilo1/Micco/Atsilo_A_Micco.pptx
@@ -5,7 +5,7 @@
     <p:sldMasterId id="2147483684" r:id="rId1"/>
   </p:sldMasterIdLst>
   <p:notesMasterIdLst>
-    <p:notesMasterId r:id="rId23"/>
+    <p:notesMasterId r:id="rId25"/>
   </p:notesMasterIdLst>
   <p:sldIdLst>
     <p:sldId id="262" r:id="rId2"/>
@@ -29,6 +29,8 @@
     <p:sldId id="279" r:id="rId20"/>
     <p:sldId id="280" r:id="rId21"/>
     <p:sldId id="281" r:id="rId22"/>
+    <p:sldId id="282" r:id="rId23"/>
+    <p:sldId id="283" r:id="rId24"/>
   </p:sldIdLst>
   <p:sldSz cx="9144000" cy="6858000" type="screen4x3"/>
   <p:notesSz cx="6858000" cy="9144000"/>
@@ -4355,9 +4357,6 @@
               </a:rPr>
               <a:t> </a:t>
             </a:r>
-            <a:endParaRPr lang="it-IT" sz="4800" b="1" dirty="0" smtClean="0">
-              <a:latin typeface="+mj-lt"/>
-            </a:endParaRPr>
           </a:p>
           <a:p>
             <a:pPr algn="ctr"/>
@@ -4821,9 +4820,6 @@
               </a:rPr>
               <a:t>Utente finale: Personale gestione Asilo</a:t>
             </a:r>
-            <a:endParaRPr lang="it-IT" sz="2800" b="1" dirty="0" smtClean="0">
-              <a:latin typeface="+mj-lt"/>
-            </a:endParaRPr>
           </a:p>
           <a:p>
             <a:pPr algn="ctr"/>
@@ -5027,7 +5023,6 @@
               <a:rPr lang="it-IT" dirty="0"/>
               <a:t>Attraverso una semplice interfaccia grafica il personale dell'asilo potrà facilmente e velocemente apprendere il funzionamento sistema e di tutte le funzionalità.</a:t>
             </a:r>
-            <a:endParaRPr lang="it-IT" dirty="0"/>
           </a:p>
         </p:txBody>
       </p:sp>
@@ -5301,13 +5296,7 @@
               <a:rPr lang="it-IT" sz="4800" b="1" dirty="0" err="1" smtClean="0">
                 <a:latin typeface="+mj-lt"/>
               </a:rPr>
-              <a:t>Trade-</a:t>
-            </a:r>
-            <a:r>
-              <a:rPr lang="it-IT" sz="4800" b="1" dirty="0" err="1" smtClean="0">
-                <a:latin typeface="+mj-lt"/>
-              </a:rPr>
-              <a:t>offs</a:t>
+              <a:t>Trade-offs</a:t>
             </a:r>
             <a:endParaRPr lang="it-IT" sz="2800" b="1" dirty="0" smtClean="0">
               <a:latin typeface="+mj-lt"/>
@@ -5607,13 +5596,7 @@
               <a:rPr lang="it-IT" sz="4800" b="1" dirty="0" err="1" smtClean="0">
                 <a:latin typeface="+mj-lt"/>
               </a:rPr>
-              <a:t>Trade-</a:t>
-            </a:r>
-            <a:r>
-              <a:rPr lang="it-IT" sz="4800" b="1" dirty="0" err="1" smtClean="0">
-                <a:latin typeface="+mj-lt"/>
-              </a:rPr>
-              <a:t>offs</a:t>
+              <a:t>Trade-offs</a:t>
             </a:r>
             <a:endParaRPr lang="it-IT" sz="2800" b="1" dirty="0" smtClean="0">
               <a:latin typeface="+mj-lt"/>
@@ -5830,7 +5813,6 @@
               <a:rPr lang="it-IT" dirty="0"/>
               <a:t>La gestione della sicurezza viene affidata all’utilizzo del login iniziale in quanto va ad autenticare l’utente al quale sarà visualizzata solo la parte del sistema a cui è abilitato, evitando così incongruenze di dati. Questa politica di permessi, permette di non appesantire eccessivamente il software ed è un buon compromesso tra sicurezza ed efficienza.</a:t>
             </a:r>
-            <a:endParaRPr lang="it-IT" dirty="0"/>
           </a:p>
         </p:txBody>
       </p:sp>
@@ -5906,13 +5888,7 @@
               <a:rPr lang="it-IT" sz="4800" b="1" dirty="0" err="1" smtClean="0">
                 <a:latin typeface="+mj-lt"/>
               </a:rPr>
-              <a:t>Trade-</a:t>
-            </a:r>
-            <a:r>
-              <a:rPr lang="it-IT" sz="4800" b="1" dirty="0" err="1" smtClean="0">
-                <a:latin typeface="+mj-lt"/>
-              </a:rPr>
-              <a:t>offs</a:t>
+              <a:t>Trade-offs</a:t>
             </a:r>
             <a:endParaRPr lang="it-IT" sz="2800" b="1" dirty="0" smtClean="0">
               <a:latin typeface="+mj-lt"/>
@@ -6145,7 +6121,6 @@
               <a:rPr lang="it-IT" dirty="0"/>
               <a:t>costi per un disco fisso sono poco onerosi quindi si è scelto di dare più rilevanza alla velocità rispetto che allo spazio. La scelta di un DBMS rispecchia questa decisione in quanto i dati persistenti richiedono più spazio sul disco ma la velocità in lettura e in scrittura è molto alta.</a:t>
             </a:r>
-            <a:endParaRPr lang="it-IT" dirty="0"/>
           </a:p>
         </p:txBody>
       </p:sp>
@@ -6221,13 +6196,7 @@
               <a:rPr lang="it-IT" sz="4800" b="1" dirty="0" err="1" smtClean="0">
                 <a:latin typeface="+mj-lt"/>
               </a:rPr>
-              <a:t>Trade-</a:t>
-            </a:r>
-            <a:r>
-              <a:rPr lang="it-IT" sz="4800" b="1" dirty="0" err="1" smtClean="0">
-                <a:latin typeface="+mj-lt"/>
-              </a:rPr>
-              <a:t>offs</a:t>
+              <a:t>Trade-offs</a:t>
             </a:r>
             <a:endParaRPr lang="it-IT" sz="2800" b="1" dirty="0" smtClean="0">
               <a:latin typeface="+mj-lt"/>
@@ -6448,7 +6417,6 @@
               <a:rPr lang="it-IT" dirty="0"/>
               <a:t>Le scadenze sono parte intrinseca del progetto, il nostro sistema garantirà oltre al rispetto delle date di consegna anche la qualità giusta delle funzionalità descritte e successivamente implementate.</a:t>
             </a:r>
-            <a:endParaRPr lang="it-IT" dirty="0"/>
           </a:p>
         </p:txBody>
       </p:sp>
@@ -6526,9 +6494,6 @@
               </a:rPr>
               <a:t>Architettura del Software </a:t>
             </a:r>
-            <a:endParaRPr lang="it-IT" sz="4800" b="1" dirty="0" smtClean="0">
-              <a:latin typeface="+mj-lt"/>
-            </a:endParaRPr>
           </a:p>
           <a:p>
             <a:pPr algn="ctr"/>
@@ -7043,7 +7008,6 @@
               <a:rPr lang="it-IT" sz="2400" dirty="0"/>
               <a:t> non presenterà complicazioni in altri sistemi).</a:t>
             </a:r>
-            <a:endParaRPr lang="it-IT" sz="2400" dirty="0"/>
           </a:p>
         </p:txBody>
       </p:sp>
@@ -7121,9 +7085,6 @@
               </a:rPr>
               <a:t>Diagramma di Deployment</a:t>
             </a:r>
-            <a:endParaRPr lang="it-IT" sz="4800" b="1" dirty="0" smtClean="0">
-              <a:latin typeface="+mj-lt"/>
-            </a:endParaRPr>
           </a:p>
           <a:p>
             <a:pPr algn="ctr"/>
@@ -7237,9 +7198,6 @@
               </a:rPr>
               <a:t>I nostri sottosistemi</a:t>
             </a:r>
-            <a:endParaRPr lang="it-IT" sz="4800" b="1" dirty="0" smtClean="0">
-              <a:latin typeface="+mj-lt"/>
-            </a:endParaRPr>
           </a:p>
           <a:p>
             <a:pPr algn="ctr"/>
@@ -7353,9 +7311,6 @@
               </a:rPr>
               <a:t>I nostri sottosistemi</a:t>
             </a:r>
-            <a:endParaRPr lang="it-IT" sz="4800" b="1" dirty="0" smtClean="0">
-              <a:latin typeface="+mj-lt"/>
-            </a:endParaRPr>
           </a:p>
           <a:p>
             <a:pPr algn="ctr"/>
@@ -7613,9 +7568,6 @@
               </a:rPr>
               <a:t>Gestione dei Dati Persistenti</a:t>
             </a:r>
-            <a:endParaRPr lang="it-IT" sz="4800" b="1" dirty="0" smtClean="0">
-              <a:latin typeface="+mj-lt"/>
-            </a:endParaRPr>
           </a:p>
           <a:p>
             <a:pPr algn="ctr"/>
@@ -7814,11 +7766,7 @@
             </a:r>
             <a:r>
               <a:rPr lang="en-US" dirty="0" smtClean="0"/>
-              <a:t> </a:t>
-            </a:r>
-            <a:r>
-              <a:rPr lang="en-US" dirty="0" smtClean="0"/>
-              <a:t>di un </a:t>
+              <a:t> di un </a:t>
             </a:r>
             <a:r>
               <a:rPr lang="en-US" dirty="0" err="1" smtClean="0"/>
@@ -7830,11 +7778,7 @@
             </a:r>
             <a:r>
               <a:rPr lang="en-US" dirty="0" err="1" smtClean="0"/>
-              <a:t>attravers</a:t>
-            </a:r>
-            <a:r>
-              <a:rPr lang="en-US" dirty="0" err="1" smtClean="0"/>
-              <a:t>o</a:t>
+              <a:t>attraverso</a:t>
             </a:r>
             <a:r>
               <a:rPr lang="en-US" dirty="0" smtClean="0"/>
@@ -8075,9 +8019,6 @@
               </a:rPr>
               <a:t>Utente finale: Genitore</a:t>
             </a:r>
-            <a:endParaRPr lang="it-IT" sz="2800" b="1" dirty="0" smtClean="0">
-              <a:latin typeface="+mj-lt"/>
-            </a:endParaRPr>
           </a:p>
           <a:p>
             <a:pPr algn="ctr"/>
@@ -8575,6 +8516,1224 @@
 </p:sld>
 </file>
 
+<file path=ppt/slides/slide22.xml><?xml version="1.0" encoding="utf-8"?>
+<p:sld xmlns:a="http://schemas.openxmlformats.org/drawingml/2006/main" xmlns:r="http://schemas.openxmlformats.org/officeDocument/2006/relationships" xmlns:p="http://schemas.openxmlformats.org/presentationml/2006/main">
+  <p:cSld>
+    <p:spTree>
+      <p:nvGrpSpPr>
+        <p:cNvPr id="1" name=""/>
+        <p:cNvGrpSpPr/>
+        <p:nvPr/>
+      </p:nvGrpSpPr>
+      <p:grpSpPr>
+        <a:xfrm>
+          <a:off x="0" y="0"/>
+          <a:ext cx="0" cy="0"/>
+          <a:chOff x="0" y="0"/>
+          <a:chExt cx="0" cy="0"/>
+        </a:xfrm>
+      </p:grpSpPr>
+      <p:sp>
+        <p:nvSpPr>
+          <p:cNvPr id="2" name="CasellaDiTesto 1"/>
+          <p:cNvSpPr txBox="1"/>
+          <p:nvPr/>
+        </p:nvSpPr>
+        <p:spPr>
+          <a:xfrm>
+            <a:off x="913038" y="476672"/>
+            <a:ext cx="7632919" cy="1107996"/>
+          </a:xfrm>
+          <a:prstGeom prst="rect">
+            <a:avLst/>
+          </a:prstGeom>
+          <a:noFill/>
+        </p:spPr>
+        <p:txBody>
+          <a:bodyPr wrap="none" rtlCol="0">
+            <a:spAutoFit/>
+          </a:bodyPr>
+          <a:lstStyle/>
+          <a:p>
+            <a:pPr algn="ctr"/>
+            <a:r>
+              <a:rPr lang="it-IT" sz="4800" b="1" dirty="0" smtClean="0">
+                <a:latin typeface="+mj-lt"/>
+              </a:rPr>
+              <a:t>Tracciabilità dei Design </a:t>
+            </a:r>
+            <a:r>
+              <a:rPr lang="it-IT" sz="4800" b="1" dirty="0" err="1" smtClean="0">
+                <a:latin typeface="+mj-lt"/>
+              </a:rPr>
+              <a:t>Goals</a:t>
+            </a:r>
+            <a:endParaRPr lang="it-IT" sz="4800" b="1" dirty="0" smtClean="0">
+              <a:latin typeface="+mj-lt"/>
+            </a:endParaRPr>
+          </a:p>
+          <a:p>
+            <a:pPr algn="ctr"/>
+            <a:endParaRPr lang="it-IT" dirty="0">
+              <a:latin typeface="+mj-lt"/>
+            </a:endParaRPr>
+          </a:p>
+        </p:txBody>
+      </p:sp>
+      <p:graphicFrame>
+        <p:nvGraphicFramePr>
+          <p:cNvPr id="5" name="Tabella 4"/>
+          <p:cNvGraphicFramePr>
+            <a:graphicFrameLocks noGrp="1"/>
+          </p:cNvGraphicFramePr>
+          <p:nvPr>
+            <p:extLst>
+              <p:ext uri="{D42A27DB-BD31-4B8C-83A1-F6EECF244321}">
+                <p14:modId xmlns:p14="http://schemas.microsoft.com/office/powerpoint/2010/main" val="1929006452"/>
+              </p:ext>
+            </p:extLst>
+          </p:nvPr>
+        </p:nvGraphicFramePr>
+        <p:xfrm>
+          <a:off x="755576" y="1484784"/>
+          <a:ext cx="7643865" cy="4714270"/>
+        </p:xfrm>
+        <a:graphic>
+          <a:graphicData uri="http://schemas.openxmlformats.org/drawingml/2006/table">
+            <a:tbl>
+              <a:tblPr firstRow="1" bandRow="1">
+                <a:tableStyleId>{5C22544A-7EE6-4342-B048-85BDC9FD1C3A}</a:tableStyleId>
+              </a:tblPr>
+              <a:tblGrid>
+                <a:gridCol w="1528773"/>
+                <a:gridCol w="1528773"/>
+                <a:gridCol w="1528773"/>
+                <a:gridCol w="1528773"/>
+                <a:gridCol w="1528773"/>
+              </a:tblGrid>
+              <a:tr h="816184">
+                <a:tc>
+                  <a:txBody>
+                    <a:bodyPr/>
+                    <a:lstStyle/>
+                    <a:p>
+                      <a:endParaRPr lang="it-IT" dirty="0"/>
+                    </a:p>
+                  </a:txBody>
+                  <a:tcPr/>
+                </a:tc>
+                <a:tc>
+                  <a:txBody>
+                    <a:bodyPr/>
+                    <a:lstStyle/>
+                    <a:p>
+                      <a:pPr marL="0" marR="0" indent="0" algn="ctr" defTabSz="914400" rtl="0" eaLnBrk="1" fontAlgn="auto" latinLnBrk="0" hangingPunct="1">
+                        <a:lnSpc>
+                          <a:spcPct val="100000"/>
+                        </a:lnSpc>
+                        <a:spcBef>
+                          <a:spcPts val="0"/>
+                        </a:spcBef>
+                        <a:spcAft>
+                          <a:spcPts val="0"/>
+                        </a:spcAft>
+                        <a:buClrTx/>
+                        <a:buSzTx/>
+                        <a:buFontTx/>
+                        <a:buNone/>
+                        <a:tabLst/>
+                        <a:defRPr/>
+                      </a:pPr>
+                      <a:r>
+                        <a:rPr lang="it-IT" sz="1050" b="1" i="1" dirty="0" smtClean="0">
+                          <a:latin typeface="Arial" pitchFamily="34" charset="0"/>
+                          <a:cs typeface="Arial" pitchFamily="34" charset="0"/>
+                        </a:rPr>
+                        <a:t>CRITERI </a:t>
+                      </a:r>
+                      <a:r>
+                        <a:rPr lang="it-IT" sz="1050" b="1" i="1" dirty="0" err="1" smtClean="0">
+                          <a:latin typeface="Arial" pitchFamily="34" charset="0"/>
+                          <a:cs typeface="Arial" pitchFamily="34" charset="0"/>
+                        </a:rPr>
+                        <a:t>DI</a:t>
+                      </a:r>
+                      <a:r>
+                        <a:rPr lang="it-IT" sz="1050" b="1" i="1" dirty="0" smtClean="0">
+                          <a:latin typeface="Arial" pitchFamily="34" charset="0"/>
+                          <a:cs typeface="Arial" pitchFamily="34" charset="0"/>
+                        </a:rPr>
+                        <a:t> PERFORMANCE</a:t>
+                      </a:r>
+                      <a:endParaRPr lang="it-IT" sz="1050" b="1" dirty="0" smtClean="0">
+                        <a:latin typeface="Arial" pitchFamily="34" charset="0"/>
+                        <a:cs typeface="Arial" pitchFamily="34" charset="0"/>
+                      </a:endParaRPr>
+                    </a:p>
+                    <a:p>
+                      <a:endParaRPr lang="it-IT" dirty="0"/>
+                    </a:p>
+                  </a:txBody>
+                  <a:tcPr/>
+                </a:tc>
+                <a:tc>
+                  <a:txBody>
+                    <a:bodyPr/>
+                    <a:lstStyle/>
+                    <a:p>
+                      <a:pPr marL="0" marR="0" indent="0" algn="ctr" defTabSz="914400" rtl="0" eaLnBrk="1" fontAlgn="auto" latinLnBrk="0" hangingPunct="1">
+                        <a:lnSpc>
+                          <a:spcPct val="100000"/>
+                        </a:lnSpc>
+                        <a:spcBef>
+                          <a:spcPts val="0"/>
+                        </a:spcBef>
+                        <a:spcAft>
+                          <a:spcPts val="0"/>
+                        </a:spcAft>
+                        <a:buClrTx/>
+                        <a:buSzTx/>
+                        <a:buFontTx/>
+                        <a:buNone/>
+                        <a:tabLst/>
+                        <a:defRPr/>
+                      </a:pPr>
+                      <a:r>
+                        <a:rPr lang="it-IT" sz="1050" i="1" dirty="0" smtClean="0"/>
+                        <a:t>DEPENDABILITY CRITERIA</a:t>
+                      </a:r>
+                      <a:endParaRPr lang="it-IT" sz="1050" dirty="0" smtClean="0"/>
+                    </a:p>
+                    <a:p>
+                      <a:endParaRPr lang="it-IT" dirty="0"/>
+                    </a:p>
+                  </a:txBody>
+                  <a:tcPr/>
+                </a:tc>
+                <a:tc>
+                  <a:txBody>
+                    <a:bodyPr/>
+                    <a:lstStyle/>
+                    <a:p>
+                      <a:pPr marL="0" marR="0" indent="0" algn="ctr" defTabSz="914400" rtl="0" eaLnBrk="1" fontAlgn="auto" latinLnBrk="0" hangingPunct="1">
+                        <a:lnSpc>
+                          <a:spcPct val="100000"/>
+                        </a:lnSpc>
+                        <a:spcBef>
+                          <a:spcPts val="0"/>
+                        </a:spcBef>
+                        <a:spcAft>
+                          <a:spcPts val="0"/>
+                        </a:spcAft>
+                        <a:buClrTx/>
+                        <a:buSzTx/>
+                        <a:buFontTx/>
+                        <a:buNone/>
+                        <a:tabLst/>
+                        <a:defRPr/>
+                      </a:pPr>
+                      <a:r>
+                        <a:rPr lang="it-IT" sz="1050" i="1" dirty="0" smtClean="0"/>
+                        <a:t>CRITERI </a:t>
+                      </a:r>
+                      <a:r>
+                        <a:rPr lang="it-IT" sz="1050" i="1" dirty="0" err="1" smtClean="0"/>
+                        <a:t>DI</a:t>
+                      </a:r>
+                      <a:r>
+                        <a:rPr lang="it-IT" sz="1050" i="1" dirty="0" smtClean="0"/>
+                        <a:t> MANUTENZIONE</a:t>
+                      </a:r>
+                      <a:endParaRPr lang="it-IT" sz="1050" dirty="0" smtClean="0"/>
+                    </a:p>
+                    <a:p>
+                      <a:endParaRPr lang="it-IT" dirty="0"/>
+                    </a:p>
+                  </a:txBody>
+                  <a:tcPr/>
+                </a:tc>
+                <a:tc>
+                  <a:txBody>
+                    <a:bodyPr/>
+                    <a:lstStyle/>
+                    <a:p>
+                      <a:pPr marL="0" marR="0" indent="0" algn="ctr" defTabSz="914400" rtl="0" eaLnBrk="1" fontAlgn="auto" latinLnBrk="0" hangingPunct="1">
+                        <a:lnSpc>
+                          <a:spcPct val="100000"/>
+                        </a:lnSpc>
+                        <a:spcBef>
+                          <a:spcPts val="0"/>
+                        </a:spcBef>
+                        <a:spcAft>
+                          <a:spcPts val="0"/>
+                        </a:spcAft>
+                        <a:buClrTx/>
+                        <a:buSzTx/>
+                        <a:buFontTx/>
+                        <a:buNone/>
+                        <a:tabLst/>
+                        <a:defRPr/>
+                      </a:pPr>
+                      <a:r>
+                        <a:rPr lang="it-IT" sz="1050" i="1" dirty="0" smtClean="0"/>
+                        <a:t>CRITERI DELL'UTENTE FINALE</a:t>
+                      </a:r>
+                      <a:endParaRPr lang="it-IT" sz="1050" dirty="0" smtClean="0"/>
+                    </a:p>
+                    <a:p>
+                      <a:endParaRPr lang="it-IT" dirty="0"/>
+                    </a:p>
+                  </a:txBody>
+                  <a:tcPr/>
+                </a:tc>
+              </a:tr>
+              <a:tr h="1044315">
+                <a:tc>
+                  <a:txBody>
+                    <a:bodyPr/>
+                    <a:lstStyle/>
+                    <a:p>
+                      <a:pPr marL="0" marR="0" indent="0" algn="ctr" defTabSz="914400" rtl="0" eaLnBrk="1" fontAlgn="auto" latinLnBrk="0" hangingPunct="1">
+                        <a:lnSpc>
+                          <a:spcPct val="100000"/>
+                        </a:lnSpc>
+                        <a:spcBef>
+                          <a:spcPts val="0"/>
+                        </a:spcBef>
+                        <a:spcAft>
+                          <a:spcPts val="0"/>
+                        </a:spcAft>
+                        <a:buClrTx/>
+                        <a:buSzTx/>
+                        <a:buFontTx/>
+                        <a:buNone/>
+                        <a:tabLst/>
+                        <a:defRPr/>
+                      </a:pPr>
+                      <a:r>
+                        <a:rPr lang="it-IT" sz="1200" dirty="0" smtClean="0">
+                          <a:latin typeface="Arial" pitchFamily="34" charset="0"/>
+                          <a:cs typeface="Arial" pitchFamily="34" charset="0"/>
+                        </a:rPr>
+                        <a:t>ARCHITETTURA DEL SISTEMA ATTUALE</a:t>
+                      </a:r>
+                    </a:p>
+                    <a:p>
+                      <a:endParaRPr lang="it-IT" dirty="0"/>
+                    </a:p>
+                  </a:txBody>
+                  <a:tcPr/>
+                </a:tc>
+                <a:tc>
+                  <a:txBody>
+                    <a:bodyPr/>
+                    <a:lstStyle/>
+                    <a:p>
+                      <a:r>
+                        <a:rPr lang="it-IT" dirty="0" smtClean="0"/>
+                        <a:t>  /</a:t>
+                      </a:r>
+                      <a:endParaRPr lang="it-IT" dirty="0"/>
+                    </a:p>
+                  </a:txBody>
+                  <a:tcPr/>
+                </a:tc>
+                <a:tc>
+                  <a:txBody>
+                    <a:bodyPr/>
+                    <a:lstStyle/>
+                    <a:p>
+                      <a:r>
+                        <a:rPr lang="it-IT" dirty="0" smtClean="0"/>
+                        <a:t>            /</a:t>
+                      </a:r>
+                      <a:endParaRPr lang="it-IT" dirty="0"/>
+                    </a:p>
+                  </a:txBody>
+                  <a:tcPr/>
+                </a:tc>
+                <a:tc>
+                  <a:txBody>
+                    <a:bodyPr/>
+                    <a:lstStyle/>
+                    <a:p>
+                      <a:pPr marL="0" marR="0" indent="0" algn="l" defTabSz="914400" rtl="0" eaLnBrk="1" fontAlgn="auto" latinLnBrk="0" hangingPunct="1">
+                        <a:lnSpc>
+                          <a:spcPct val="100000"/>
+                        </a:lnSpc>
+                        <a:spcBef>
+                          <a:spcPts val="0"/>
+                        </a:spcBef>
+                        <a:spcAft>
+                          <a:spcPts val="0"/>
+                        </a:spcAft>
+                        <a:buClrTx/>
+                        <a:buSzTx/>
+                        <a:buFontTx/>
+                        <a:buNone/>
+                        <a:tabLst/>
+                        <a:defRPr/>
+                      </a:pPr>
+                      <a:r>
+                        <a:rPr lang="it-IT" sz="1100" dirty="0" smtClean="0"/>
+                        <a:t>L’architettura Three-</a:t>
+                      </a:r>
+                      <a:r>
+                        <a:rPr lang="it-IT" sz="1100" dirty="0" err="1" smtClean="0"/>
+                        <a:t>Tier</a:t>
+                      </a:r>
+                      <a:r>
+                        <a:rPr lang="it-IT" sz="1100" dirty="0" smtClean="0"/>
+                        <a:t> </a:t>
+                      </a:r>
+                      <a:r>
+                        <a:rPr lang="it-IT" sz="1100" dirty="0" smtClean="0"/>
+                        <a:t>soddisfa l'obiettivo di estendibilità e modificabilità.</a:t>
+                      </a:r>
+                    </a:p>
+                    <a:p>
+                      <a:endParaRPr lang="it-IT" dirty="0"/>
+                    </a:p>
+                  </a:txBody>
+                  <a:tcPr/>
+                </a:tc>
+                <a:tc>
+                  <a:txBody>
+                    <a:bodyPr/>
+                    <a:lstStyle/>
+                    <a:p>
+                      <a:r>
+                        <a:rPr lang="it-IT" dirty="0" smtClean="0"/>
+                        <a:t>           /</a:t>
+                      </a:r>
+                      <a:endParaRPr lang="it-IT" dirty="0"/>
+                    </a:p>
+                  </a:txBody>
+                  <a:tcPr/>
+                </a:tc>
+              </a:tr>
+              <a:tr h="1158052">
+                <a:tc>
+                  <a:txBody>
+                    <a:bodyPr/>
+                    <a:lstStyle/>
+                    <a:p>
+                      <a:pPr marL="0" marR="0" indent="0" algn="ctr" defTabSz="914400" rtl="0" eaLnBrk="1" fontAlgn="auto" latinLnBrk="0" hangingPunct="1">
+                        <a:lnSpc>
+                          <a:spcPct val="100000"/>
+                        </a:lnSpc>
+                        <a:spcBef>
+                          <a:spcPts val="0"/>
+                        </a:spcBef>
+                        <a:spcAft>
+                          <a:spcPts val="0"/>
+                        </a:spcAft>
+                        <a:buClrTx/>
+                        <a:buSzTx/>
+                        <a:buFontTx/>
+                        <a:buNone/>
+                        <a:tabLst/>
+                        <a:defRPr/>
+                      </a:pPr>
+                      <a:r>
+                        <a:rPr lang="it-IT" sz="1400" dirty="0" smtClean="0">
+                          <a:latin typeface="Arial" pitchFamily="34" charset="0"/>
+                          <a:cs typeface="Arial" pitchFamily="34" charset="0"/>
+                        </a:rPr>
+                        <a:t>MAPPING HW/SW</a:t>
+                      </a:r>
+                    </a:p>
+                    <a:p>
+                      <a:endParaRPr lang="it-IT" dirty="0"/>
+                    </a:p>
+                  </a:txBody>
+                  <a:tcPr/>
+                </a:tc>
+                <a:tc>
+                  <a:txBody>
+                    <a:bodyPr/>
+                    <a:lstStyle/>
+                    <a:p>
+                      <a:r>
+                        <a:rPr lang="it-IT" dirty="0" smtClean="0"/>
+                        <a:t>  /</a:t>
+                      </a:r>
+                      <a:endParaRPr lang="it-IT" dirty="0"/>
+                    </a:p>
+                  </a:txBody>
+                  <a:tcPr/>
+                </a:tc>
+                <a:tc>
+                  <a:txBody>
+                    <a:bodyPr/>
+                    <a:lstStyle/>
+                    <a:p>
+                      <a:pPr marL="0" marR="0" indent="0" algn="l" defTabSz="914400" rtl="0" eaLnBrk="1" fontAlgn="auto" latinLnBrk="0" hangingPunct="1">
+                        <a:lnSpc>
+                          <a:spcPct val="100000"/>
+                        </a:lnSpc>
+                        <a:spcBef>
+                          <a:spcPts val="0"/>
+                        </a:spcBef>
+                        <a:spcAft>
+                          <a:spcPts val="0"/>
+                        </a:spcAft>
+                        <a:buClrTx/>
+                        <a:buSzTx/>
+                        <a:buFontTx/>
+                        <a:buNone/>
+                        <a:tabLst/>
+                        <a:defRPr/>
+                      </a:pPr>
+                      <a:r>
+                        <a:rPr lang="it-IT" sz="1100" dirty="0" smtClean="0"/>
+                        <a:t>L’architettura</a:t>
+                      </a:r>
+                      <a:r>
+                        <a:rPr lang="it-IT" sz="1100" baseline="0" dirty="0" smtClean="0"/>
+                        <a:t> </a:t>
+                      </a:r>
+                      <a:r>
+                        <a:rPr lang="it-IT" sz="1100" baseline="0" dirty="0" err="1" smtClean="0"/>
+                        <a:t>client-server</a:t>
+                      </a:r>
+                      <a:r>
+                        <a:rPr lang="it-IT" sz="1100" baseline="0" dirty="0" smtClean="0"/>
+                        <a:t> </a:t>
+                      </a:r>
+                      <a:r>
+                        <a:rPr lang="it-IT" sz="1100" dirty="0" smtClean="0"/>
+                        <a:t>soddisfa gli </a:t>
+                      </a:r>
+                      <a:r>
+                        <a:rPr lang="it-IT" sz="1100" dirty="0" smtClean="0"/>
+                        <a:t>obiettivi di affidabilità e </a:t>
+                      </a:r>
+                      <a:r>
+                        <a:rPr lang="it-IT" sz="1100" dirty="0" smtClean="0"/>
+                        <a:t>disponibilità.</a:t>
+                      </a:r>
+                      <a:endParaRPr lang="it-IT" sz="1100" dirty="0" smtClean="0"/>
+                    </a:p>
+                    <a:p>
+                      <a:endParaRPr lang="it-IT" dirty="0"/>
+                    </a:p>
+                  </a:txBody>
+                  <a:tcPr/>
+                </a:tc>
+                <a:tc>
+                  <a:txBody>
+                    <a:bodyPr/>
+                    <a:lstStyle/>
+                    <a:p>
+                      <a:r>
+                        <a:rPr lang="it-IT" dirty="0" smtClean="0"/>
+                        <a:t>     /</a:t>
+                      </a:r>
+                      <a:endParaRPr lang="it-IT" dirty="0"/>
+                    </a:p>
+                  </a:txBody>
+                  <a:tcPr/>
+                </a:tc>
+                <a:tc>
+                  <a:txBody>
+                    <a:bodyPr/>
+                    <a:lstStyle/>
+                    <a:p>
+                      <a:r>
+                        <a:rPr lang="it-IT" dirty="0" smtClean="0"/>
+                        <a:t>      /</a:t>
+                      </a:r>
+                      <a:endParaRPr lang="it-IT" dirty="0"/>
+                    </a:p>
+                  </a:txBody>
+                  <a:tcPr/>
+                </a:tc>
+              </a:tr>
+              <a:tr h="1695719">
+                <a:tc>
+                  <a:txBody>
+                    <a:bodyPr/>
+                    <a:lstStyle/>
+                    <a:p>
+                      <a:pPr marL="0" marR="0" indent="0" algn="ctr" defTabSz="914400" rtl="0" eaLnBrk="1" fontAlgn="auto" latinLnBrk="0" hangingPunct="1">
+                        <a:lnSpc>
+                          <a:spcPct val="100000"/>
+                        </a:lnSpc>
+                        <a:spcBef>
+                          <a:spcPts val="0"/>
+                        </a:spcBef>
+                        <a:spcAft>
+                          <a:spcPts val="0"/>
+                        </a:spcAft>
+                        <a:buClrTx/>
+                        <a:buSzTx/>
+                        <a:buFontTx/>
+                        <a:buNone/>
+                        <a:tabLst/>
+                        <a:defRPr/>
+                      </a:pPr>
+                      <a:r>
+                        <a:rPr lang="it-IT" sz="1200" dirty="0" smtClean="0">
+                          <a:latin typeface="Arial" pitchFamily="34" charset="0"/>
+                          <a:cs typeface="Arial" pitchFamily="34" charset="0"/>
+                        </a:rPr>
+                        <a:t>GESTIONE DEI DATI PERSISTENTI</a:t>
+                      </a:r>
+                    </a:p>
+                    <a:p>
+                      <a:endParaRPr lang="it-IT" dirty="0"/>
+                    </a:p>
+                  </a:txBody>
+                  <a:tcPr/>
+                </a:tc>
+                <a:tc>
+                  <a:txBody>
+                    <a:bodyPr/>
+                    <a:lstStyle/>
+                    <a:p>
+                      <a:r>
+                        <a:rPr lang="it-IT" dirty="0" smtClean="0"/>
+                        <a:t>/</a:t>
+                      </a:r>
+                      <a:endParaRPr lang="it-IT" dirty="0"/>
+                    </a:p>
+                  </a:txBody>
+                  <a:tcPr/>
+                </a:tc>
+                <a:tc>
+                  <a:txBody>
+                    <a:bodyPr/>
+                    <a:lstStyle/>
+                    <a:p>
+                      <a:pPr marL="0" marR="0" indent="0" algn="l" defTabSz="914400" rtl="0" eaLnBrk="1" fontAlgn="auto" latinLnBrk="0" hangingPunct="1">
+                        <a:lnSpc>
+                          <a:spcPct val="100000"/>
+                        </a:lnSpc>
+                        <a:spcBef>
+                          <a:spcPts val="0"/>
+                        </a:spcBef>
+                        <a:spcAft>
+                          <a:spcPts val="0"/>
+                        </a:spcAft>
+                        <a:buClrTx/>
+                        <a:buSzTx/>
+                        <a:buFontTx/>
+                        <a:buNone/>
+                        <a:tabLst/>
+                        <a:defRPr/>
+                      </a:pPr>
+                      <a:r>
+                        <a:rPr lang="it-IT" sz="1100" dirty="0" smtClean="0"/>
+                        <a:t>La gestione dei </a:t>
+                      </a:r>
+                      <a:r>
+                        <a:rPr lang="it-IT" sz="1100" dirty="0" smtClean="0"/>
+                        <a:t>dati persistenti </a:t>
+                      </a:r>
+                      <a:r>
+                        <a:rPr lang="it-IT" sz="1100" dirty="0" smtClean="0"/>
+                        <a:t>attraverso </a:t>
+                      </a:r>
+                      <a:r>
+                        <a:rPr lang="it-IT" sz="1100" dirty="0" smtClean="0"/>
+                        <a:t>DBMS soddisfa </a:t>
+                      </a:r>
+                      <a:r>
+                        <a:rPr lang="it-IT" sz="1100" dirty="0" smtClean="0"/>
+                        <a:t>l'obiettivo di sicurezza.</a:t>
+                      </a:r>
+                    </a:p>
+                    <a:p>
+                      <a:endParaRPr lang="it-IT" dirty="0"/>
+                    </a:p>
+                  </a:txBody>
+                  <a:tcPr/>
+                </a:tc>
+                <a:tc>
+                  <a:txBody>
+                    <a:bodyPr/>
+                    <a:lstStyle/>
+                    <a:p>
+                      <a:pPr marL="0" marR="0" indent="0" algn="l" defTabSz="914400" rtl="0" eaLnBrk="1" fontAlgn="auto" latinLnBrk="0" hangingPunct="1">
+                        <a:lnSpc>
+                          <a:spcPct val="100000"/>
+                        </a:lnSpc>
+                        <a:spcBef>
+                          <a:spcPts val="0"/>
+                        </a:spcBef>
+                        <a:spcAft>
+                          <a:spcPts val="0"/>
+                        </a:spcAft>
+                        <a:buClrTx/>
+                        <a:buSzTx/>
+                        <a:buFontTx/>
+                        <a:buNone/>
+                        <a:tabLst/>
+                        <a:defRPr/>
+                      </a:pPr>
+                      <a:r>
+                        <a:rPr lang="it-IT" sz="1100" dirty="0" smtClean="0"/>
+                        <a:t>La gestione dei dati persistenti </a:t>
+                      </a:r>
+                      <a:r>
+                        <a:rPr lang="it-IT" sz="1100" dirty="0" smtClean="0"/>
+                        <a:t>attraverso</a:t>
+                      </a:r>
+                      <a:r>
+                        <a:rPr lang="it-IT" sz="1100" baseline="0" dirty="0" smtClean="0"/>
+                        <a:t> DBMS </a:t>
+                      </a:r>
+                      <a:r>
+                        <a:rPr lang="it-IT" sz="1100" dirty="0" smtClean="0"/>
+                        <a:t>soddisfa </a:t>
+                      </a:r>
+                      <a:r>
+                        <a:rPr lang="it-IT" sz="1100" dirty="0" smtClean="0"/>
+                        <a:t>l'obiettivo di portabilità.</a:t>
+                      </a:r>
+                    </a:p>
+                    <a:p>
+                      <a:endParaRPr lang="it-IT" dirty="0"/>
+                    </a:p>
+                  </a:txBody>
+                  <a:tcPr/>
+                </a:tc>
+                <a:tc>
+                  <a:txBody>
+                    <a:bodyPr/>
+                    <a:lstStyle/>
+                    <a:p>
+                      <a:r>
+                        <a:rPr lang="it-IT" dirty="0" smtClean="0"/>
+                        <a:t> /</a:t>
+                      </a:r>
+                      <a:endParaRPr lang="it-IT" dirty="0"/>
+                    </a:p>
+                  </a:txBody>
+                  <a:tcPr/>
+                </a:tc>
+              </a:tr>
+            </a:tbl>
+          </a:graphicData>
+        </a:graphic>
+      </p:graphicFrame>
+    </p:spTree>
+    <p:extLst>
+      <p:ext uri="{BB962C8B-B14F-4D97-AF65-F5344CB8AC3E}">
+        <p14:creationId xmlns:p14="http://schemas.microsoft.com/office/powerpoint/2010/main" val="4224656279"/>
+      </p:ext>
+    </p:extLst>
+  </p:cSld>
+  <p:clrMapOvr>
+    <a:masterClrMapping/>
+  </p:clrMapOvr>
+  <mc:AlternateContent xmlns:mc="http://schemas.openxmlformats.org/markup-compatibility/2006" xmlns:p14="http://schemas.microsoft.com/office/powerpoint/2010/main">
+    <mc:Choice Requires="p14">
+      <p:transition spd="slow" p14:dur="2000"/>
+    </mc:Choice>
+    <mc:Fallback xmlns="">
+      <p:transition spd="slow"/>
+    </mc:Fallback>
+  </mc:AlternateContent>
+  <p:timing>
+    <p:tnLst>
+      <p:par>
+        <p:cTn xmlns:p14="http://schemas.microsoft.com/office/powerpoint/2010/main" id="1" dur="indefinite" restart="never" nodeType="tmRoot"/>
+      </p:par>
+    </p:tnLst>
+  </p:timing>
+</p:sld>
+</file>
+
+<file path=ppt/slides/slide23.xml><?xml version="1.0" encoding="utf-8"?>
+<p:sld xmlns:a="http://schemas.openxmlformats.org/drawingml/2006/main" xmlns:r="http://schemas.openxmlformats.org/officeDocument/2006/relationships" xmlns:p="http://schemas.openxmlformats.org/presentationml/2006/main">
+  <p:cSld>
+    <p:spTree>
+      <p:nvGrpSpPr>
+        <p:cNvPr id="1" name=""/>
+        <p:cNvGrpSpPr/>
+        <p:nvPr/>
+      </p:nvGrpSpPr>
+      <p:grpSpPr>
+        <a:xfrm>
+          <a:off x="0" y="0"/>
+          <a:ext cx="0" cy="0"/>
+          <a:chOff x="0" y="0"/>
+          <a:chExt cx="0" cy="0"/>
+        </a:xfrm>
+      </p:grpSpPr>
+      <p:sp>
+        <p:nvSpPr>
+          <p:cNvPr id="2" name="CasellaDiTesto 1"/>
+          <p:cNvSpPr txBox="1"/>
+          <p:nvPr/>
+        </p:nvSpPr>
+        <p:spPr>
+          <a:xfrm>
+            <a:off x="3621553" y="476672"/>
+            <a:ext cx="2215846" cy="1538883"/>
+          </a:xfrm>
+          <a:prstGeom prst="rect">
+            <a:avLst/>
+          </a:prstGeom>
+          <a:noFill/>
+        </p:spPr>
+        <p:txBody>
+          <a:bodyPr wrap="none" rtlCol="0">
+            <a:spAutoFit/>
+          </a:bodyPr>
+          <a:lstStyle/>
+          <a:p>
+            <a:pPr algn="ctr"/>
+            <a:r>
+              <a:rPr lang="it-IT" sz="4800" b="1" dirty="0" smtClean="0">
+                <a:latin typeface="+mj-lt"/>
+              </a:rPr>
+              <a:t>SDD</a:t>
+            </a:r>
+            <a:endParaRPr lang="it-IT" sz="4800" b="1" dirty="0" smtClean="0">
+              <a:latin typeface="+mj-lt"/>
+            </a:endParaRPr>
+          </a:p>
+          <a:p>
+            <a:pPr algn="ctr"/>
+            <a:r>
+              <a:rPr lang="it-IT" sz="2800" b="1" dirty="0" smtClean="0">
+                <a:latin typeface="+mj-lt"/>
+              </a:rPr>
+              <a:t>Pregi e Difetti</a:t>
+            </a:r>
+            <a:endParaRPr lang="it-IT" sz="2800" b="1" dirty="0" smtClean="0">
+              <a:latin typeface="+mj-lt"/>
+            </a:endParaRPr>
+          </a:p>
+          <a:p>
+            <a:pPr algn="ctr"/>
+            <a:endParaRPr lang="it-IT" dirty="0">
+              <a:latin typeface="+mj-lt"/>
+            </a:endParaRPr>
+          </a:p>
+        </p:txBody>
+      </p:sp>
+      <p:sp>
+        <p:nvSpPr>
+          <p:cNvPr id="4" name="Content Placeholder 3"/>
+          <p:cNvSpPr txBox="1">
+            <a:spLocks/>
+          </p:cNvSpPr>
+          <p:nvPr/>
+        </p:nvSpPr>
+        <p:spPr>
+          <a:xfrm>
+            <a:off x="323528" y="2060848"/>
+            <a:ext cx="8509373" cy="1080120"/>
+          </a:xfrm>
+          <a:prstGeom prst="rect">
+            <a:avLst/>
+          </a:prstGeom>
+        </p:spPr>
+        <p:txBody>
+          <a:bodyPr tIns="0"/>
+          <a:lstStyle>
+            <a:lvl1pPr marL="274320" indent="-274320" algn="l" rtl="0" eaLnBrk="1" latinLnBrk="0" hangingPunct="1">
+              <a:spcBef>
+                <a:spcPct val="20000"/>
+              </a:spcBef>
+              <a:buClrTx/>
+              <a:buSzPct val="95000"/>
+              <a:buFont typeface="Wingdings" pitchFamily="2" charset="2"/>
+              <a:buChar char="v"/>
+              <a:defRPr kumimoji="0" sz="2800" kern="1200">
+                <a:solidFill>
+                  <a:schemeClr val="tx1"/>
+                </a:solidFill>
+                <a:latin typeface="+mn-lt"/>
+                <a:ea typeface="+mn-ea"/>
+                <a:cs typeface="+mn-cs"/>
+              </a:defRPr>
+            </a:lvl1pPr>
+            <a:lvl2pPr marL="640080" indent="-246888" algn="l" rtl="0" eaLnBrk="1" latinLnBrk="0" hangingPunct="1">
+              <a:spcBef>
+                <a:spcPct val="20000"/>
+              </a:spcBef>
+              <a:buClrTx/>
+              <a:buSzPct val="85000"/>
+              <a:buFont typeface="Courier New" pitchFamily="49" charset="0"/>
+              <a:buChar char="o"/>
+              <a:defRPr kumimoji="0" sz="2600" kern="1200">
+                <a:solidFill>
+                  <a:schemeClr val="tx1"/>
+                </a:solidFill>
+                <a:latin typeface="+mn-lt"/>
+                <a:ea typeface="+mn-ea"/>
+                <a:cs typeface="+mn-cs"/>
+              </a:defRPr>
+            </a:lvl2pPr>
+            <a:lvl3pPr marL="914400" indent="-246888" algn="l" rtl="0" eaLnBrk="1" latinLnBrk="0" hangingPunct="1">
+              <a:spcBef>
+                <a:spcPct val="20000"/>
+              </a:spcBef>
+              <a:buClrTx/>
+              <a:buSzPct val="70000"/>
+              <a:buFont typeface="Wingdings 2"/>
+              <a:buChar char=""/>
+              <a:defRPr kumimoji="0" sz="2400" kern="1200">
+                <a:solidFill>
+                  <a:schemeClr val="tx1"/>
+                </a:solidFill>
+                <a:latin typeface="+mn-lt"/>
+                <a:ea typeface="+mn-ea"/>
+                <a:cs typeface="+mn-cs"/>
+              </a:defRPr>
+            </a:lvl3pPr>
+            <a:lvl4pPr marL="1188720" indent="-210312" algn="l" rtl="0" eaLnBrk="1" latinLnBrk="0" hangingPunct="1">
+              <a:spcBef>
+                <a:spcPct val="20000"/>
+              </a:spcBef>
+              <a:buClrTx/>
+              <a:buSzPct val="65000"/>
+              <a:buFont typeface="Wingdings 2"/>
+              <a:buChar char=""/>
+              <a:defRPr kumimoji="0" sz="2000" kern="1200">
+                <a:solidFill>
+                  <a:schemeClr val="tx1"/>
+                </a:solidFill>
+                <a:latin typeface="+mn-lt"/>
+                <a:ea typeface="+mn-ea"/>
+                <a:cs typeface="+mn-cs"/>
+              </a:defRPr>
+            </a:lvl4pPr>
+            <a:lvl5pPr marL="1463040" indent="-210312" algn="l" rtl="0" eaLnBrk="1" latinLnBrk="0" hangingPunct="1">
+              <a:spcBef>
+                <a:spcPct val="20000"/>
+              </a:spcBef>
+              <a:buClrTx/>
+              <a:buSzPct val="65000"/>
+              <a:buFont typeface="Wingdings 2"/>
+              <a:buChar char=""/>
+              <a:defRPr kumimoji="0" sz="1800" kern="1200">
+                <a:solidFill>
+                  <a:schemeClr val="tx1"/>
+                </a:solidFill>
+                <a:latin typeface="+mn-lt"/>
+                <a:ea typeface="+mn-ea"/>
+                <a:cs typeface="+mn-cs"/>
+              </a:defRPr>
+            </a:lvl5pPr>
+            <a:lvl6pPr marL="1737360" indent="-210312" algn="l" rtl="0" eaLnBrk="1" latinLnBrk="0" hangingPunct="1">
+              <a:spcBef>
+                <a:spcPct val="20000"/>
+              </a:spcBef>
+              <a:buClr>
+                <a:schemeClr val="accent5"/>
+              </a:buClr>
+              <a:buSzPct val="80000"/>
+              <a:buFont typeface="Wingdings 2"/>
+              <a:buChar char=""/>
+              <a:defRPr kumimoji="0" sz="1800" kern="1200">
+                <a:solidFill>
+                  <a:schemeClr val="tx1"/>
+                </a:solidFill>
+                <a:latin typeface="+mn-lt"/>
+                <a:ea typeface="+mn-ea"/>
+                <a:cs typeface="+mn-cs"/>
+              </a:defRPr>
+            </a:lvl6pPr>
+            <a:lvl7pPr marL="1920240" indent="-182880" algn="l" rtl="0" eaLnBrk="1" latinLnBrk="0" hangingPunct="1">
+              <a:spcBef>
+                <a:spcPct val="20000"/>
+              </a:spcBef>
+              <a:buClr>
+                <a:schemeClr val="accent6"/>
+              </a:buClr>
+              <a:buSzPct val="80000"/>
+              <a:buFont typeface="Wingdings 2"/>
+              <a:buChar char=""/>
+              <a:defRPr kumimoji="0" sz="1600" kern="1200" baseline="0">
+                <a:solidFill>
+                  <a:schemeClr val="tx1"/>
+                </a:solidFill>
+                <a:latin typeface="+mn-lt"/>
+                <a:ea typeface="+mn-ea"/>
+                <a:cs typeface="+mn-cs"/>
+              </a:defRPr>
+            </a:lvl7pPr>
+            <a:lvl8pPr marL="2194560" indent="-182880" algn="l" rtl="0" eaLnBrk="1" latinLnBrk="0" hangingPunct="1">
+              <a:spcBef>
+                <a:spcPct val="20000"/>
+              </a:spcBef>
+              <a:buClr>
+                <a:schemeClr val="tx2"/>
+              </a:buClr>
+              <a:buChar char="•"/>
+              <a:defRPr kumimoji="0" sz="1600" kern="1200">
+                <a:solidFill>
+                  <a:schemeClr val="tx1"/>
+                </a:solidFill>
+                <a:latin typeface="+mn-lt"/>
+                <a:ea typeface="+mn-ea"/>
+                <a:cs typeface="+mn-cs"/>
+              </a:defRPr>
+            </a:lvl8pPr>
+            <a:lvl9pPr marL="2468880" indent="-182880" algn="l" rtl="0" eaLnBrk="1" latinLnBrk="0" hangingPunct="1">
+              <a:spcBef>
+                <a:spcPct val="20000"/>
+              </a:spcBef>
+              <a:buClr>
+                <a:schemeClr val="tx2"/>
+              </a:buClr>
+              <a:buFontTx/>
+              <a:buChar char="•"/>
+              <a:defRPr kumimoji="0" sz="1400" kern="1200" baseline="0">
+                <a:solidFill>
+                  <a:schemeClr val="tx1"/>
+                </a:solidFill>
+                <a:latin typeface="+mn-lt"/>
+                <a:ea typeface="+mn-ea"/>
+                <a:cs typeface="+mn-cs"/>
+              </a:defRPr>
+            </a:lvl9pPr>
+          </a:lstStyle>
+          <a:p>
+            <a:r>
+              <a:rPr lang="it-IT" dirty="0" smtClean="0"/>
+              <a:t>Cosa è andato bene…</a:t>
+            </a:r>
+            <a:endParaRPr lang="it-IT" dirty="0" smtClean="0"/>
+          </a:p>
+          <a:p>
+            <a:pPr lvl="1"/>
+            <a:r>
+              <a:rPr lang="it-IT" dirty="0" smtClean="0"/>
+              <a:t>Definizione precisa, corretta e coerente dei sottosistemi.</a:t>
+            </a:r>
+          </a:p>
+        </p:txBody>
+      </p:sp>
+      <p:sp>
+        <p:nvSpPr>
+          <p:cNvPr id="5" name="Content Placeholder 3"/>
+          <p:cNvSpPr txBox="1">
+            <a:spLocks/>
+          </p:cNvSpPr>
+          <p:nvPr/>
+        </p:nvSpPr>
+        <p:spPr>
+          <a:xfrm>
+            <a:off x="323528" y="3573016"/>
+            <a:ext cx="8509373" cy="2304256"/>
+          </a:xfrm>
+          <a:prstGeom prst="rect">
+            <a:avLst/>
+          </a:prstGeom>
+        </p:spPr>
+        <p:txBody>
+          <a:bodyPr tIns="0"/>
+          <a:lstStyle>
+            <a:lvl1pPr marL="274320" indent="-274320" algn="l" rtl="0" eaLnBrk="1" latinLnBrk="0" hangingPunct="1">
+              <a:spcBef>
+                <a:spcPct val="20000"/>
+              </a:spcBef>
+              <a:buClrTx/>
+              <a:buSzPct val="95000"/>
+              <a:buFont typeface="Wingdings" pitchFamily="2" charset="2"/>
+              <a:buChar char="v"/>
+              <a:defRPr kumimoji="0" sz="2800" kern="1200">
+                <a:solidFill>
+                  <a:schemeClr val="tx1"/>
+                </a:solidFill>
+                <a:latin typeface="+mn-lt"/>
+                <a:ea typeface="+mn-ea"/>
+                <a:cs typeface="+mn-cs"/>
+              </a:defRPr>
+            </a:lvl1pPr>
+            <a:lvl2pPr marL="640080" indent="-246888" algn="l" rtl="0" eaLnBrk="1" latinLnBrk="0" hangingPunct="1">
+              <a:spcBef>
+                <a:spcPct val="20000"/>
+              </a:spcBef>
+              <a:buClrTx/>
+              <a:buSzPct val="85000"/>
+              <a:buFont typeface="Courier New" pitchFamily="49" charset="0"/>
+              <a:buChar char="o"/>
+              <a:defRPr kumimoji="0" sz="2600" kern="1200">
+                <a:solidFill>
+                  <a:schemeClr val="tx1"/>
+                </a:solidFill>
+                <a:latin typeface="+mn-lt"/>
+                <a:ea typeface="+mn-ea"/>
+                <a:cs typeface="+mn-cs"/>
+              </a:defRPr>
+            </a:lvl2pPr>
+            <a:lvl3pPr marL="914400" indent="-246888" algn="l" rtl="0" eaLnBrk="1" latinLnBrk="0" hangingPunct="1">
+              <a:spcBef>
+                <a:spcPct val="20000"/>
+              </a:spcBef>
+              <a:buClrTx/>
+              <a:buSzPct val="70000"/>
+              <a:buFont typeface="Wingdings 2"/>
+              <a:buChar char=""/>
+              <a:defRPr kumimoji="0" sz="2400" kern="1200">
+                <a:solidFill>
+                  <a:schemeClr val="tx1"/>
+                </a:solidFill>
+                <a:latin typeface="+mn-lt"/>
+                <a:ea typeface="+mn-ea"/>
+                <a:cs typeface="+mn-cs"/>
+              </a:defRPr>
+            </a:lvl3pPr>
+            <a:lvl4pPr marL="1188720" indent="-210312" algn="l" rtl="0" eaLnBrk="1" latinLnBrk="0" hangingPunct="1">
+              <a:spcBef>
+                <a:spcPct val="20000"/>
+              </a:spcBef>
+              <a:buClrTx/>
+              <a:buSzPct val="65000"/>
+              <a:buFont typeface="Wingdings 2"/>
+              <a:buChar char=""/>
+              <a:defRPr kumimoji="0" sz="2000" kern="1200">
+                <a:solidFill>
+                  <a:schemeClr val="tx1"/>
+                </a:solidFill>
+                <a:latin typeface="+mn-lt"/>
+                <a:ea typeface="+mn-ea"/>
+                <a:cs typeface="+mn-cs"/>
+              </a:defRPr>
+            </a:lvl4pPr>
+            <a:lvl5pPr marL="1463040" indent="-210312" algn="l" rtl="0" eaLnBrk="1" latinLnBrk="0" hangingPunct="1">
+              <a:spcBef>
+                <a:spcPct val="20000"/>
+              </a:spcBef>
+              <a:buClrTx/>
+              <a:buSzPct val="65000"/>
+              <a:buFont typeface="Wingdings 2"/>
+              <a:buChar char=""/>
+              <a:defRPr kumimoji="0" sz="1800" kern="1200">
+                <a:solidFill>
+                  <a:schemeClr val="tx1"/>
+                </a:solidFill>
+                <a:latin typeface="+mn-lt"/>
+                <a:ea typeface="+mn-ea"/>
+                <a:cs typeface="+mn-cs"/>
+              </a:defRPr>
+            </a:lvl5pPr>
+            <a:lvl6pPr marL="1737360" indent="-210312" algn="l" rtl="0" eaLnBrk="1" latinLnBrk="0" hangingPunct="1">
+              <a:spcBef>
+                <a:spcPct val="20000"/>
+              </a:spcBef>
+              <a:buClr>
+                <a:schemeClr val="accent5"/>
+              </a:buClr>
+              <a:buSzPct val="80000"/>
+              <a:buFont typeface="Wingdings 2"/>
+              <a:buChar char=""/>
+              <a:defRPr kumimoji="0" sz="1800" kern="1200">
+                <a:solidFill>
+                  <a:schemeClr val="tx1"/>
+                </a:solidFill>
+                <a:latin typeface="+mn-lt"/>
+                <a:ea typeface="+mn-ea"/>
+                <a:cs typeface="+mn-cs"/>
+              </a:defRPr>
+            </a:lvl6pPr>
+            <a:lvl7pPr marL="1920240" indent="-182880" algn="l" rtl="0" eaLnBrk="1" latinLnBrk="0" hangingPunct="1">
+              <a:spcBef>
+                <a:spcPct val="20000"/>
+              </a:spcBef>
+              <a:buClr>
+                <a:schemeClr val="accent6"/>
+              </a:buClr>
+              <a:buSzPct val="80000"/>
+              <a:buFont typeface="Wingdings 2"/>
+              <a:buChar char=""/>
+              <a:defRPr kumimoji="0" sz="1600" kern="1200" baseline="0">
+                <a:solidFill>
+                  <a:schemeClr val="tx1"/>
+                </a:solidFill>
+                <a:latin typeface="+mn-lt"/>
+                <a:ea typeface="+mn-ea"/>
+                <a:cs typeface="+mn-cs"/>
+              </a:defRPr>
+            </a:lvl7pPr>
+            <a:lvl8pPr marL="2194560" indent="-182880" algn="l" rtl="0" eaLnBrk="1" latinLnBrk="0" hangingPunct="1">
+              <a:spcBef>
+                <a:spcPct val="20000"/>
+              </a:spcBef>
+              <a:buClr>
+                <a:schemeClr val="tx2"/>
+              </a:buClr>
+              <a:buChar char="•"/>
+              <a:defRPr kumimoji="0" sz="1600" kern="1200">
+                <a:solidFill>
+                  <a:schemeClr val="tx1"/>
+                </a:solidFill>
+                <a:latin typeface="+mn-lt"/>
+                <a:ea typeface="+mn-ea"/>
+                <a:cs typeface="+mn-cs"/>
+              </a:defRPr>
+            </a:lvl8pPr>
+            <a:lvl9pPr marL="2468880" indent="-182880" algn="l" rtl="0" eaLnBrk="1" latinLnBrk="0" hangingPunct="1">
+              <a:spcBef>
+                <a:spcPct val="20000"/>
+              </a:spcBef>
+              <a:buClr>
+                <a:schemeClr val="tx2"/>
+              </a:buClr>
+              <a:buFontTx/>
+              <a:buChar char="•"/>
+              <a:defRPr kumimoji="0" sz="1400" kern="1200" baseline="0">
+                <a:solidFill>
+                  <a:schemeClr val="tx1"/>
+                </a:solidFill>
+                <a:latin typeface="+mn-lt"/>
+                <a:ea typeface="+mn-ea"/>
+                <a:cs typeface="+mn-cs"/>
+              </a:defRPr>
+            </a:lvl9pPr>
+          </a:lstStyle>
+          <a:p>
+            <a:r>
+              <a:rPr lang="it-IT" dirty="0" smtClean="0"/>
+              <a:t>Cosa è andato male…</a:t>
+            </a:r>
+            <a:endParaRPr lang="it-IT" dirty="0" smtClean="0"/>
+          </a:p>
+          <a:p>
+            <a:pPr lvl="1"/>
+            <a:r>
+              <a:rPr lang="it-IT" dirty="0" smtClean="0"/>
+              <a:t>Gestione dei dati persistenti inizialmente imprecisa, raffinata poi nelle varie versioni a seconda delle nuove e sempre più rigide esigenze del committente.</a:t>
+            </a:r>
+          </a:p>
+        </p:txBody>
+      </p:sp>
+    </p:spTree>
+    <p:extLst>
+      <p:ext uri="{BB962C8B-B14F-4D97-AF65-F5344CB8AC3E}">
+        <p14:creationId xmlns:p14="http://schemas.microsoft.com/office/powerpoint/2010/main" val="3207728919"/>
+      </p:ext>
+    </p:extLst>
+  </p:cSld>
+  <p:clrMapOvr>
+    <a:masterClrMapping/>
+  </p:clrMapOvr>
+  <mc:AlternateContent xmlns:mc="http://schemas.openxmlformats.org/markup-compatibility/2006" xmlns:p14="http://schemas.microsoft.com/office/powerpoint/2010/main">
+    <mc:Choice Requires="p14">
+      <p:transition spd="slow" p14:dur="2000"/>
+    </mc:Choice>
+    <mc:Fallback xmlns="">
+      <p:transition spd="slow"/>
+    </mc:Fallback>
+  </mc:AlternateContent>
+  <p:timing>
+    <p:tnLst>
+      <p:par>
+        <p:cTn xmlns:p14="http://schemas.microsoft.com/office/powerpoint/2010/main" id="1" dur="indefinite" restart="never" nodeType="tmRoot"/>
+      </p:par>
+    </p:tnLst>
+  </p:timing>
+</p:sld>
+</file>
+
 <file path=ppt/slides/slide3.xml><?xml version="1.0" encoding="utf-8"?>
 <p:sld xmlns:a="http://schemas.openxmlformats.org/drawingml/2006/main" xmlns:r="http://schemas.openxmlformats.org/officeDocument/2006/relationships" xmlns:p="http://schemas.openxmlformats.org/presentationml/2006/main">
   <p:cSld>
@@ -8639,9 +9798,6 @@
               </a:rPr>
               <a:t>Utente finale: Genitore</a:t>
             </a:r>
-            <a:endParaRPr lang="it-IT" sz="2800" b="1" dirty="0" smtClean="0">
-              <a:latin typeface="+mj-lt"/>
-            </a:endParaRPr>
           </a:p>
           <a:p>
             <a:pPr algn="ctr"/>
@@ -8972,9 +10128,6 @@
               </a:rPr>
               <a:t>Utente finale: Genitore</a:t>
             </a:r>
-            <a:endParaRPr lang="it-IT" sz="2800" b="1" dirty="0" smtClean="0">
-              <a:latin typeface="+mj-lt"/>
-            </a:endParaRPr>
           </a:p>
           <a:p>
             <a:pPr algn="ctr"/>
@@ -9314,9 +10467,6 @@
               </a:rPr>
               <a:t>Utente finale: Genitore</a:t>
             </a:r>
-            <a:endParaRPr lang="it-IT" sz="2800" b="1" dirty="0" smtClean="0">
-              <a:latin typeface="+mj-lt"/>
-            </a:endParaRPr>
           </a:p>
           <a:p>
             <a:pPr algn="ctr"/>
@@ -9616,9 +10766,6 @@
               </a:rPr>
               <a:t>Utente finale: Genitore</a:t>
             </a:r>
-            <a:endParaRPr lang="it-IT" sz="2800" b="1" dirty="0" smtClean="0">
-              <a:latin typeface="+mj-lt"/>
-            </a:endParaRPr>
           </a:p>
           <a:p>
             <a:pPr algn="ctr"/>
@@ -9922,9 +11069,6 @@
               </a:rPr>
               <a:t>Utente finale: Personale gestione Asilo</a:t>
             </a:r>
-            <a:endParaRPr lang="it-IT" sz="2800" b="1" dirty="0" smtClean="0">
-              <a:latin typeface="+mj-lt"/>
-            </a:endParaRPr>
           </a:p>
           <a:p>
             <a:pPr algn="ctr"/>
@@ -10148,7 +11292,6 @@
               <a:rPr lang="it-IT" dirty="0"/>
               <a:t>essendo progettato per essere eseguito su macchine diverse e utilizzato anche tramite browser, è scalabile ed adattabile a nuovi sviluppi hardware e software.</a:t>
             </a:r>
-            <a:endParaRPr lang="it-IT" dirty="0"/>
           </a:p>
         </p:txBody>
       </p:sp>
@@ -10244,9 +11387,6 @@
               </a:rPr>
               <a:t>Utente finale: Personale gestione Asilo</a:t>
             </a:r>
-            <a:endParaRPr lang="it-IT" sz="2800" b="1" dirty="0" smtClean="0">
-              <a:latin typeface="+mj-lt"/>
-            </a:endParaRPr>
           </a:p>
           <a:p>
             <a:pPr algn="ctr"/>
@@ -10466,7 +11606,6 @@
               <a:rPr lang="it-IT" dirty="0"/>
               <a:t>poter effettuare vari operazioni come la visualizzazione delle risposte dei genitori ai questionari valutativi in meno otto click.</a:t>
             </a:r>
-            <a:endParaRPr lang="it-IT" dirty="0"/>
           </a:p>
         </p:txBody>
       </p:sp>
@@ -10562,9 +11701,6 @@
               </a:rPr>
               <a:t>Utente finale: Personale gestione Asilo</a:t>
             </a:r>
-            <a:endParaRPr lang="it-IT" sz="2800" b="1" dirty="0" smtClean="0">
-              <a:latin typeface="+mj-lt"/>
-            </a:endParaRPr>
           </a:p>
           <a:p>
             <a:pPr algn="ctr"/>

</xml_diff>

<commit_message>
[WT A] Presentazione definitiva.
</commit_message>
<xml_diff>
--- a/Presentazione/Atsilo1/Micco/Atsilo_A_Micco.pptx
+++ b/Presentazione/Atsilo1/Micco/Atsilo_A_Micco.pptx
@@ -8589,14 +8589,14 @@
           <p:nvPr>
             <p:extLst>
               <p:ext uri="{D42A27DB-BD31-4B8C-83A1-F6EECF244321}">
-                <p14:modId xmlns:p14="http://schemas.microsoft.com/office/powerpoint/2010/main" val="1929006452"/>
+                <p14:modId xmlns:p14="http://schemas.microsoft.com/office/powerpoint/2010/main" val="327753603"/>
               </p:ext>
             </p:extLst>
           </p:nvPr>
         </p:nvGraphicFramePr>
         <p:xfrm>
           <a:off x="755576" y="1484784"/>
-          <a:ext cx="7643865" cy="4714270"/>
+          <a:ext cx="7704856" cy="4767235"/>
         </p:xfrm>
         <a:graphic>
           <a:graphicData uri="http://schemas.openxmlformats.org/drawingml/2006/table">
@@ -8605,11 +8605,10 @@
                 <a:tableStyleId>{5C22544A-7EE6-4342-B048-85BDC9FD1C3A}</a:tableStyleId>
               </a:tblPr>
               <a:tblGrid>
-                <a:gridCol w="1528773"/>
-                <a:gridCol w="1528773"/>
-                <a:gridCol w="1528773"/>
-                <a:gridCol w="1528773"/>
-                <a:gridCol w="1528773"/>
+                <a:gridCol w="2086749"/>
+                <a:gridCol w="1765679"/>
+                <a:gridCol w="1926214"/>
+                <a:gridCol w="1926214"/>
               </a:tblGrid>
               <a:tr h="816184">
                 <a:tc>
@@ -8752,40 +8751,6 @@
                   </a:txBody>
                   <a:tcPr/>
                 </a:tc>
-                <a:tc>
-                  <a:txBody>
-                    <a:bodyPr/>
-                    <a:lstStyle/>
-                    <a:p>
-                      <a:pPr marL="0" marR="0" indent="0" algn="ctr" defTabSz="914400" rtl="0" eaLnBrk="1" fontAlgn="auto" latinLnBrk="0" hangingPunct="1">
-                        <a:lnSpc>
-                          <a:spcPct val="100000"/>
-                        </a:lnSpc>
-                        <a:spcBef>
-                          <a:spcPts val="0"/>
-                        </a:spcBef>
-                        <a:spcAft>
-                          <a:spcPts val="0"/>
-                        </a:spcAft>
-                        <a:buClrTx/>
-                        <a:buSzTx/>
-                        <a:buFontTx/>
-                        <a:buNone/>
-                        <a:tabLst/>
-                        <a:defRPr/>
-                      </a:pPr>
-                      <a:r>
-                        <a:rPr lang="it-IT" sz="1050" i="1" dirty="0" smtClean="0"/>
-                        <a:t>CRITERI DELL'UTENTE FINALE</a:t>
-                      </a:r>
-                      <a:endParaRPr lang="it-IT" sz="1050" dirty="0" smtClean="0"/>
-                    </a:p>
-                    <a:p>
-                      <a:endParaRPr lang="it-IT" dirty="0"/>
-                    </a:p>
-                  </a:txBody>
-                  <a:tcPr/>
-                </a:tc>
               </a:tr>
               <a:tr h="1044315">
                 <a:tc>
@@ -8815,6 +8780,20 @@
                           <a:latin typeface="Arial" pitchFamily="34" charset="0"/>
                           <a:cs typeface="Arial" pitchFamily="34" charset="0"/>
                         </a:rPr>
+                        <a:t>DEFINIZIONE E IMPLEMENTAZIONE</a:t>
+                      </a:r>
+                      <a:r>
+                        <a:rPr lang="it-IT" sz="1200" baseline="0" dirty="0" smtClean="0">
+                          <a:latin typeface="Arial" pitchFamily="34" charset="0"/>
+                          <a:cs typeface="Arial" pitchFamily="34" charset="0"/>
+                        </a:rPr>
+                        <a:t> </a:t>
+                      </a:r>
+                      <a:r>
+                        <a:rPr lang="it-IT" sz="1200" dirty="0" smtClean="0">
+                          <a:latin typeface="Arial" pitchFamily="34" charset="0"/>
+                          <a:cs typeface="Arial" pitchFamily="34" charset="0"/>
+                        </a:rPr>
                         <a:t>ARCHITETTURA DEL SISTEMA ATTUALE</a:t>
                       </a:r>
                     </a:p>
@@ -8830,10 +8809,14 @@
                     <a:lstStyle/>
                     <a:p>
                       <a:r>
-                        <a:rPr lang="it-IT" dirty="0" smtClean="0"/>
-                        <a:t>  /</a:t>
+                        <a:rPr lang="it-IT" sz="1100" dirty="0" smtClean="0"/>
+                        <a:t>L’implementazione dei</a:t>
                       </a:r>
-                      <a:endParaRPr lang="it-IT" dirty="0"/>
+                      <a:r>
+                        <a:rPr lang="it-IT" sz="1100" baseline="0" dirty="0" smtClean="0"/>
+                        <a:t> processi compiuti da genitori e personale soddisfa gli obiettivi in termini di tempi di risposta.</a:t>
+                      </a:r>
+                      <a:endParaRPr lang="it-IT" sz="1100" dirty="0"/>
                     </a:p>
                   </a:txBody>
                   <a:tcPr/>
@@ -8843,11 +8826,40 @@
                     <a:bodyPr/>
                     <a:lstStyle/>
                     <a:p>
+                      <a:pPr algn="l"/>
                       <a:r>
-                        <a:rPr lang="it-IT" dirty="0" smtClean="0"/>
-                        <a:t>            /</a:t>
+                        <a:rPr lang="it-IT" sz="1100" dirty="0" smtClean="0"/>
+                        <a:t>I</a:t>
                       </a:r>
-                      <a:endParaRPr lang="it-IT" dirty="0"/>
+                      <a:r>
+                        <a:rPr lang="it-IT" sz="1100" baseline="0" dirty="0" smtClean="0"/>
+                        <a:t> controlli sull’input </a:t>
+                      </a:r>
+                      <a:r>
+                        <a:rPr lang="it-IT" sz="1100" baseline="0" dirty="0" err="1" smtClean="0"/>
+                        <a:t>al’atto</a:t>
+                      </a:r>
+                      <a:r>
+                        <a:rPr lang="it-IT" sz="1100" baseline="0" dirty="0" smtClean="0"/>
+                        <a:t> dell’inserimento (allo scopo di evitar </a:t>
+                      </a:r>
+                      <a:r>
+                        <a:rPr lang="it-IT" sz="1100" baseline="0" dirty="0" err="1" smtClean="0"/>
+                        <a:t>failures</a:t>
+                      </a:r>
+                      <a:r>
+                        <a:rPr lang="it-IT" sz="1100" baseline="0" dirty="0" smtClean="0"/>
+                        <a:t>) soddisfano gli obiettivi di </a:t>
+                      </a:r>
+                      <a:r>
+                        <a:rPr lang="it-IT" sz="1100" dirty="0" err="1" smtClean="0"/>
+                        <a:t>ffidabilità</a:t>
+                      </a:r>
+                      <a:r>
+                        <a:rPr lang="it-IT" sz="1100" dirty="0" smtClean="0"/>
+                        <a:t> e disponibilità.</a:t>
+                      </a:r>
+                      <a:endParaRPr lang="it-IT" sz="1100" dirty="0"/>
                     </a:p>
                   </a:txBody>
                   <a:tcPr/>
@@ -8884,28 +8896,10 @@
                       </a:r>
                       <a:r>
                         <a:rPr lang="it-IT" sz="1100" dirty="0" smtClean="0"/>
-                        <a:t> </a:t>
-                      </a:r>
-                      <a:r>
-                        <a:rPr lang="it-IT" sz="1100" dirty="0" smtClean="0"/>
-                        <a:t>soddisfa l'obiettivo di estendibilità e modificabilità.</a:t>
+                        <a:t> soddisfa l'obiettivo di estendibilità e modificabilità.</a:t>
                       </a:r>
                     </a:p>
                     <a:p>
-                      <a:endParaRPr lang="it-IT" dirty="0"/>
-                    </a:p>
-                  </a:txBody>
-                  <a:tcPr/>
-                </a:tc>
-                <a:tc>
-                  <a:txBody>
-                    <a:bodyPr/>
-                    <a:lstStyle/>
-                    <a:p>
-                      <a:r>
-                        <a:rPr lang="it-IT" dirty="0" smtClean="0"/>
-                        <a:t>           /</a:t>
-                      </a:r>
                       <a:endParaRPr lang="it-IT" dirty="0"/>
                     </a:p>
                   </a:txBody>
@@ -9003,17 +8997,8 @@
                       </a:r>
                       <a:r>
                         <a:rPr lang="it-IT" sz="1100" dirty="0" smtClean="0"/>
-                        <a:t>soddisfa gli </a:t>
+                        <a:t>soddisfa gli obiettivi di affidabilità e disponibilità.</a:t>
                       </a:r>
-                      <a:r>
-                        <a:rPr lang="it-IT" sz="1100" dirty="0" smtClean="0"/>
-                        <a:t>obiettivi di affidabilità e </a:t>
-                      </a:r>
-                      <a:r>
-                        <a:rPr lang="it-IT" sz="1100" dirty="0" smtClean="0"/>
-                        <a:t>disponibilità.</a:t>
-                      </a:r>
-                      <a:endParaRPr lang="it-IT" sz="1100" dirty="0" smtClean="0"/>
                     </a:p>
                     <a:p>
                       <a:endParaRPr lang="it-IT" dirty="0"/>
@@ -9028,21 +9013,7 @@
                     <a:p>
                       <a:r>
                         <a:rPr lang="it-IT" dirty="0" smtClean="0"/>
-                        <a:t>     /</a:t>
-                      </a:r>
-                      <a:endParaRPr lang="it-IT" dirty="0"/>
-                    </a:p>
-                  </a:txBody>
-                  <a:tcPr/>
-                </a:tc>
-                <a:tc>
-                  <a:txBody>
-                    <a:bodyPr/>
-                    <a:lstStyle/>
-                    <a:p>
-                      <a:r>
-                        <a:rPr lang="it-IT" dirty="0" smtClean="0"/>
-                        <a:t>      /</a:t>
+                        <a:t> /</a:t>
                       </a:r>
                       <a:endParaRPr lang="it-IT" dirty="0"/>
                     </a:p>
@@ -9125,23 +9096,7 @@
                       </a:pPr>
                       <a:r>
                         <a:rPr lang="it-IT" sz="1100" dirty="0" smtClean="0"/>
-                        <a:t>La gestione dei </a:t>
-                      </a:r>
-                      <a:r>
-                        <a:rPr lang="it-IT" sz="1100" dirty="0" smtClean="0"/>
-                        <a:t>dati persistenti </a:t>
-                      </a:r>
-                      <a:r>
-                        <a:rPr lang="it-IT" sz="1100" dirty="0" smtClean="0"/>
-                        <a:t>attraverso </a:t>
-                      </a:r>
-                      <a:r>
-                        <a:rPr lang="it-IT" sz="1100" dirty="0" smtClean="0"/>
-                        <a:t>DBMS soddisfa </a:t>
-                      </a:r>
-                      <a:r>
-                        <a:rPr lang="it-IT" sz="1100" dirty="0" smtClean="0"/>
-                        <a:t>l'obiettivo di sicurezza.</a:t>
+                        <a:t>La gestione dei dati persistenti attraverso DBMS soddisfa l'obiettivo di sicurezza.</a:t>
                       </a:r>
                     </a:p>
                     <a:p>
@@ -9174,11 +9129,7 @@
                       </a:pPr>
                       <a:r>
                         <a:rPr lang="it-IT" sz="1100" dirty="0" smtClean="0"/>
-                        <a:t>La gestione dei dati persistenti </a:t>
-                      </a:r>
-                      <a:r>
-                        <a:rPr lang="it-IT" sz="1100" dirty="0" smtClean="0"/>
-                        <a:t>attraverso</a:t>
+                        <a:t>La gestione dei dati persistenti attraverso</a:t>
                       </a:r>
                       <a:r>
                         <a:rPr lang="it-IT" sz="1100" baseline="0" dirty="0" smtClean="0"/>
@@ -9186,28 +9137,10 @@
                       </a:r>
                       <a:r>
                         <a:rPr lang="it-IT" sz="1100" dirty="0" smtClean="0"/>
-                        <a:t>soddisfa </a:t>
-                      </a:r>
-                      <a:r>
-                        <a:rPr lang="it-IT" sz="1100" dirty="0" smtClean="0"/>
-                        <a:t>l'obiettivo di portabilità.</a:t>
+                        <a:t>soddisfa l'obiettivo di portabilità.</a:t>
                       </a:r>
                     </a:p>
                     <a:p>
-                      <a:endParaRPr lang="it-IT" dirty="0"/>
-                    </a:p>
-                  </a:txBody>
-                  <a:tcPr/>
-                </a:tc>
-                <a:tc>
-                  <a:txBody>
-                    <a:bodyPr/>
-                    <a:lstStyle/>
-                    <a:p>
-                      <a:r>
-                        <a:rPr lang="it-IT" dirty="0" smtClean="0"/>
-                        <a:t> /</a:t>
-                      </a:r>
                       <a:endParaRPr lang="it-IT" dirty="0"/>
                     </a:p>
                   </a:txBody>
@@ -9292,9 +9225,6 @@
               </a:rPr>
               <a:t>SDD</a:t>
             </a:r>
-            <a:endParaRPr lang="it-IT" sz="4800" b="1" dirty="0" smtClean="0">
-              <a:latin typeface="+mj-lt"/>
-            </a:endParaRPr>
           </a:p>
           <a:p>
             <a:pPr algn="ctr"/>
@@ -9304,9 +9234,6 @@
               </a:rPr>
               <a:t>Pregi e Difetti</a:t>
             </a:r>
-            <a:endParaRPr lang="it-IT" sz="2800" b="1" dirty="0" smtClean="0">
-              <a:latin typeface="+mj-lt"/>
-            </a:endParaRPr>
           </a:p>
           <a:p>
             <a:pPr algn="ctr"/>
@@ -9497,10 +9424,9 @@
           </a:lstStyle>
           <a:p>
             <a:r>
-              <a:rPr lang="it-IT" dirty="0" smtClean="0"/>
+              <a:rPr lang="it-IT" b="1" i="1" dirty="0" smtClean="0"/>
               <a:t>Cosa è andato bene…</a:t>
             </a:r>
-            <a:endParaRPr lang="it-IT" dirty="0" smtClean="0"/>
           </a:p>
           <a:p>
             <a:pPr lvl="1"/>
@@ -9692,10 +9618,9 @@
           </a:lstStyle>
           <a:p>
             <a:r>
-              <a:rPr lang="it-IT" dirty="0" smtClean="0"/>
+              <a:rPr lang="it-IT" b="1" i="1" dirty="0" smtClean="0"/>
               <a:t>Cosa è andato male…</a:t>
             </a:r>
-            <a:endParaRPr lang="it-IT" dirty="0" smtClean="0"/>
           </a:p>
           <a:p>
             <a:pPr lvl="1"/>

</xml_diff>

<commit_message>
[WR A] Presentazione revisionata
</commit_message>
<xml_diff>
--- a/Presentazione/Atsilo1/Micco/Atsilo_A_Micco.pptx
+++ b/Presentazione/Atsilo1/Micco/Atsilo_A_Micco.pptx
@@ -6111,15 +6111,41 @@
             </a:pPr>
             <a:r>
               <a:rPr lang="it-IT" dirty="0"/>
-              <a:t>Il prodotto dovrà memorizzare informazioni inerenti alle differenti entità riscontrate, essenzialmente il carico complessivo dei dati non influirà sulla velocità del sistema. Oltre modo le operazioni delle funzionalità implementate richiederanno un brevissimo tempo di </a:t>
+              <a:t>Il prodotto dovrà memorizzare informazioni inerenti alle differenti entità </a:t>
             </a:r>
             <a:r>
               <a:rPr lang="it-IT" dirty="0" smtClean="0"/>
-              <a:t>risposta. I </a:t>
+              <a:t>riscontrate</a:t>
+            </a:r>
+            <a:r>
+              <a:rPr lang="it-IT" dirty="0" smtClean="0"/>
+              <a:t>; </a:t>
+            </a:r>
+            <a:r>
+              <a:rPr lang="it-IT" dirty="0" smtClean="0"/>
+              <a:t>il </a:t>
             </a:r>
             <a:r>
               <a:rPr lang="it-IT" dirty="0"/>
-              <a:t>costi per un disco fisso sono poco onerosi quindi si è scelto di dare più rilevanza alla velocità rispetto che allo spazio. La scelta di un DBMS rispecchia questa decisione in quanto i dati persistenti richiedono più spazio sul disco ma la velocità in lettura e in scrittura è molto alta.</a:t>
+              <a:t>carico complessivo dei dati non influirà sulla velocità del sistema. Oltre modo le operazioni delle funzionalità implementate richiederanno un brevissimo tempo di </a:t>
+            </a:r>
+            <a:r>
+              <a:rPr lang="it-IT" dirty="0" smtClean="0"/>
+              <a:t>risposta. </a:t>
+            </a:r>
+            <a:endParaRPr lang="it-IT" dirty="0" smtClean="0"/>
+          </a:p>
+          <a:p>
+            <a:pPr marL="0" indent="0" algn="just">
+              <a:buNone/>
+            </a:pPr>
+            <a:r>
+              <a:rPr lang="it-IT" dirty="0" smtClean="0"/>
+              <a:t>Si </a:t>
+            </a:r>
+            <a:r>
+              <a:rPr lang="it-IT" dirty="0"/>
+              <a:t>è scelto di dare più rilevanza alla velocità rispetto che allo spazio. La scelta di un DBMS rispecchia questa decisione in quanto i dati persistenti richiedono più spazio sul disco ma la velocità in lettura e in scrittura è molto alta.</a:t>
             </a:r>
           </a:p>
         </p:txBody>
@@ -6415,7 +6441,15 @@
             </a:pPr>
             <a:r>
               <a:rPr lang="it-IT" dirty="0"/>
-              <a:t>Le scadenze sono parte intrinseca del progetto, il nostro sistema garantirà oltre al rispetto delle date di consegna anche la qualità giusta delle funzionalità descritte e successivamente implementate.</a:t>
+              <a:t>Le scadenze sono parte intrinseca del progetto, il nostro sistema </a:t>
+            </a:r>
+            <a:r>
+              <a:rPr lang="it-IT" dirty="0" smtClean="0"/>
+              <a:t>garantisce </a:t>
+            </a:r>
+            <a:r>
+              <a:rPr lang="it-IT" dirty="0"/>
+              <a:t>oltre al rispetto delle date di consegna anche la qualità giusta delle funzionalità descritte e successivamente implementate.</a:t>
             </a:r>
           </a:p>
         </p:txBody>
@@ -6503,514 +6537,36 @@
           </a:p>
         </p:txBody>
       </p:sp>
-      <p:sp>
-        <p:nvSpPr>
-          <p:cNvPr id="10" name="Content Placeholder 3"/>
-          <p:cNvSpPr txBox="1">
-            <a:spLocks/>
-          </p:cNvSpPr>
+      <p:pic>
+        <p:nvPicPr>
+          <p:cNvPr id="3" name="Immagine 2" descr="Schermata 2012-12-28 a 22.35.46.png"/>
+          <p:cNvPicPr>
+            <a:picLocks noChangeAspect="1"/>
+          </p:cNvPicPr>
           <p:nvPr/>
-        </p:nvSpPr>
+        </p:nvPicPr>
+        <p:blipFill>
+          <a:blip r:embed="rId2">
+            <a:extLst>
+              <a:ext uri="{28A0092B-C50C-407E-A947-70E740481C1C}">
+                <a14:useLocalDpi xmlns:a14="http://schemas.microsoft.com/office/drawing/2010/main" val="0"/>
+              </a:ext>
+            </a:extLst>
+          </a:blip>
+          <a:stretch>
+            <a:fillRect/>
+          </a:stretch>
+        </p:blipFill>
         <p:spPr>
           <a:xfrm>
-            <a:off x="323528" y="1412776"/>
-            <a:ext cx="8496944" cy="3528392"/>
+            <a:off x="2555776" y="1245235"/>
+            <a:ext cx="4214671" cy="5589240"/>
           </a:xfrm>
           <a:prstGeom prst="rect">
             <a:avLst/>
           </a:prstGeom>
         </p:spPr>
-        <p:txBody>
-          <a:bodyPr tIns="0"/>
-          <a:lstStyle>
-            <a:lvl1pPr marL="274320" indent="-274320" algn="l" rtl="0" eaLnBrk="1" latinLnBrk="0" hangingPunct="1">
-              <a:spcBef>
-                <a:spcPct val="20000"/>
-              </a:spcBef>
-              <a:buClrTx/>
-              <a:buSzPct val="95000"/>
-              <a:buFont typeface="Wingdings" pitchFamily="2" charset="2"/>
-              <a:buChar char="v"/>
-              <a:defRPr kumimoji="0" sz="2800" kern="1200">
-                <a:solidFill>
-                  <a:schemeClr val="tx1"/>
-                </a:solidFill>
-                <a:latin typeface="+mn-lt"/>
-                <a:ea typeface="+mn-ea"/>
-                <a:cs typeface="+mn-cs"/>
-              </a:defRPr>
-            </a:lvl1pPr>
-            <a:lvl2pPr marL="640080" indent="-246888" algn="l" rtl="0" eaLnBrk="1" latinLnBrk="0" hangingPunct="1">
-              <a:spcBef>
-                <a:spcPct val="20000"/>
-              </a:spcBef>
-              <a:buClrTx/>
-              <a:buSzPct val="85000"/>
-              <a:buFont typeface="Courier New" pitchFamily="49" charset="0"/>
-              <a:buChar char="o"/>
-              <a:defRPr kumimoji="0" sz="2600" kern="1200">
-                <a:solidFill>
-                  <a:schemeClr val="tx1"/>
-                </a:solidFill>
-                <a:latin typeface="+mn-lt"/>
-                <a:ea typeface="+mn-ea"/>
-                <a:cs typeface="+mn-cs"/>
-              </a:defRPr>
-            </a:lvl2pPr>
-            <a:lvl3pPr marL="914400" indent="-246888" algn="l" rtl="0" eaLnBrk="1" latinLnBrk="0" hangingPunct="1">
-              <a:spcBef>
-                <a:spcPct val="20000"/>
-              </a:spcBef>
-              <a:buClrTx/>
-              <a:buSzPct val="70000"/>
-              <a:buFont typeface="Wingdings 2"/>
-              <a:buChar char=""/>
-              <a:defRPr kumimoji="0" sz="2400" kern="1200">
-                <a:solidFill>
-                  <a:schemeClr val="tx1"/>
-                </a:solidFill>
-                <a:latin typeface="+mn-lt"/>
-                <a:ea typeface="+mn-ea"/>
-                <a:cs typeface="+mn-cs"/>
-              </a:defRPr>
-            </a:lvl3pPr>
-            <a:lvl4pPr marL="1188720" indent="-210312" algn="l" rtl="0" eaLnBrk="1" latinLnBrk="0" hangingPunct="1">
-              <a:spcBef>
-                <a:spcPct val="20000"/>
-              </a:spcBef>
-              <a:buClrTx/>
-              <a:buSzPct val="65000"/>
-              <a:buFont typeface="Wingdings 2"/>
-              <a:buChar char=""/>
-              <a:defRPr kumimoji="0" sz="2000" kern="1200">
-                <a:solidFill>
-                  <a:schemeClr val="tx1"/>
-                </a:solidFill>
-                <a:latin typeface="+mn-lt"/>
-                <a:ea typeface="+mn-ea"/>
-                <a:cs typeface="+mn-cs"/>
-              </a:defRPr>
-            </a:lvl4pPr>
-            <a:lvl5pPr marL="1463040" indent="-210312" algn="l" rtl="0" eaLnBrk="1" latinLnBrk="0" hangingPunct="1">
-              <a:spcBef>
-                <a:spcPct val="20000"/>
-              </a:spcBef>
-              <a:buClrTx/>
-              <a:buSzPct val="65000"/>
-              <a:buFont typeface="Wingdings 2"/>
-              <a:buChar char=""/>
-              <a:defRPr kumimoji="0" sz="1800" kern="1200">
-                <a:solidFill>
-                  <a:schemeClr val="tx1"/>
-                </a:solidFill>
-                <a:latin typeface="+mn-lt"/>
-                <a:ea typeface="+mn-ea"/>
-                <a:cs typeface="+mn-cs"/>
-              </a:defRPr>
-            </a:lvl5pPr>
-            <a:lvl6pPr marL="1737360" indent="-210312" algn="l" rtl="0" eaLnBrk="1" latinLnBrk="0" hangingPunct="1">
-              <a:spcBef>
-                <a:spcPct val="20000"/>
-              </a:spcBef>
-              <a:buClr>
-                <a:schemeClr val="accent5"/>
-              </a:buClr>
-              <a:buSzPct val="80000"/>
-              <a:buFont typeface="Wingdings 2"/>
-              <a:buChar char=""/>
-              <a:defRPr kumimoji="0" sz="1800" kern="1200">
-                <a:solidFill>
-                  <a:schemeClr val="tx1"/>
-                </a:solidFill>
-                <a:latin typeface="+mn-lt"/>
-                <a:ea typeface="+mn-ea"/>
-                <a:cs typeface="+mn-cs"/>
-              </a:defRPr>
-            </a:lvl6pPr>
-            <a:lvl7pPr marL="1920240" indent="-182880" algn="l" rtl="0" eaLnBrk="1" latinLnBrk="0" hangingPunct="1">
-              <a:spcBef>
-                <a:spcPct val="20000"/>
-              </a:spcBef>
-              <a:buClr>
-                <a:schemeClr val="accent6"/>
-              </a:buClr>
-              <a:buSzPct val="80000"/>
-              <a:buFont typeface="Wingdings 2"/>
-              <a:buChar char=""/>
-              <a:defRPr kumimoji="0" sz="1600" kern="1200" baseline="0">
-                <a:solidFill>
-                  <a:schemeClr val="tx1"/>
-                </a:solidFill>
-                <a:latin typeface="+mn-lt"/>
-                <a:ea typeface="+mn-ea"/>
-                <a:cs typeface="+mn-cs"/>
-              </a:defRPr>
-            </a:lvl7pPr>
-            <a:lvl8pPr marL="2194560" indent="-182880" algn="l" rtl="0" eaLnBrk="1" latinLnBrk="0" hangingPunct="1">
-              <a:spcBef>
-                <a:spcPct val="20000"/>
-              </a:spcBef>
-              <a:buClr>
-                <a:schemeClr val="tx2"/>
-              </a:buClr>
-              <a:buChar char="•"/>
-              <a:defRPr kumimoji="0" sz="1600" kern="1200">
-                <a:solidFill>
-                  <a:schemeClr val="tx1"/>
-                </a:solidFill>
-                <a:latin typeface="+mn-lt"/>
-                <a:ea typeface="+mn-ea"/>
-                <a:cs typeface="+mn-cs"/>
-              </a:defRPr>
-            </a:lvl8pPr>
-            <a:lvl9pPr marL="2468880" indent="-182880" algn="l" rtl="0" eaLnBrk="1" latinLnBrk="0" hangingPunct="1">
-              <a:spcBef>
-                <a:spcPct val="20000"/>
-              </a:spcBef>
-              <a:buClr>
-                <a:schemeClr val="tx2"/>
-              </a:buClr>
-              <a:buFontTx/>
-              <a:buChar char="•"/>
-              <a:defRPr kumimoji="0" sz="1400" kern="1200" baseline="0">
-                <a:solidFill>
-                  <a:schemeClr val="tx1"/>
-                </a:solidFill>
-                <a:latin typeface="+mn-lt"/>
-                <a:ea typeface="+mn-ea"/>
-                <a:cs typeface="+mn-cs"/>
-              </a:defRPr>
-            </a:lvl9pPr>
-          </a:lstStyle>
-          <a:p>
-            <a:pPr marL="0" indent="0" algn="just">
-              <a:buNone/>
-            </a:pPr>
-            <a:r>
-              <a:rPr lang="en-US" sz="2400" b="1" dirty="0" err="1" smtClean="0"/>
-              <a:t>Logica</a:t>
-            </a:r>
-            <a:r>
-              <a:rPr lang="en-US" sz="2400" b="1" dirty="0" smtClean="0"/>
-              <a:t> client-server Three-Tier</a:t>
-            </a:r>
-            <a:endParaRPr lang="it-IT" sz="2400" dirty="0"/>
-          </a:p>
-          <a:p>
-            <a:pPr algn="just"/>
-            <a:r>
-              <a:rPr lang="it-IT" sz="2400" b="1" dirty="0" smtClean="0"/>
-              <a:t>Interface </a:t>
-            </a:r>
-            <a:r>
-              <a:rPr lang="it-IT" sz="2400" b="1" dirty="0" err="1"/>
-              <a:t>Layer</a:t>
-            </a:r>
-            <a:r>
-              <a:rPr lang="it-IT" sz="2400" dirty="0"/>
-              <a:t>: lato client, è il </a:t>
-            </a:r>
-            <a:r>
-              <a:rPr lang="it-IT" sz="2400" dirty="0" err="1"/>
-              <a:t>layer</a:t>
-            </a:r>
-            <a:r>
-              <a:rPr lang="it-IT" sz="2400" dirty="0"/>
-              <a:t> caratterizzato dalle interfacce grafiche che permettono all'utente di interagire col server</a:t>
-            </a:r>
-            <a:r>
-              <a:rPr lang="it-IT" sz="2400" dirty="0" smtClean="0"/>
-              <a:t>;</a:t>
-            </a:r>
-            <a:endParaRPr lang="it-IT" sz="2400" dirty="0"/>
-          </a:p>
-          <a:p>
-            <a:pPr algn="just"/>
-            <a:r>
-              <a:rPr lang="it-IT" sz="2400" b="1" dirty="0" smtClean="0"/>
-              <a:t>Application </a:t>
-            </a:r>
-            <a:r>
-              <a:rPr lang="it-IT" sz="2400" b="1" dirty="0" err="1"/>
-              <a:t>Logic</a:t>
-            </a:r>
-            <a:r>
-              <a:rPr lang="it-IT" sz="2400" b="1" dirty="0"/>
-              <a:t> </a:t>
-            </a:r>
-            <a:r>
-              <a:rPr lang="it-IT" sz="2400" b="1" dirty="0" err="1"/>
-              <a:t>Layer</a:t>
-            </a:r>
-            <a:r>
-              <a:rPr lang="it-IT" sz="2400" b="1" dirty="0"/>
-              <a:t>: </a:t>
-            </a:r>
-            <a:r>
-              <a:rPr lang="it-IT" sz="2400" dirty="0"/>
-              <a:t>lato server, è il </a:t>
-            </a:r>
-            <a:r>
-              <a:rPr lang="it-IT" sz="2400" dirty="0" err="1"/>
-              <a:t>layer</a:t>
-            </a:r>
-            <a:r>
-              <a:rPr lang="it-IT" sz="2400" dirty="0"/>
-              <a:t> che contiene e gestisce le operazioni necessarie a compiere i servizi che l'utente richiede</a:t>
-            </a:r>
-            <a:r>
-              <a:rPr lang="it-IT" sz="2400" dirty="0" smtClean="0"/>
-              <a:t>;</a:t>
-            </a:r>
-            <a:endParaRPr lang="it-IT" sz="2400" dirty="0"/>
-          </a:p>
-          <a:p>
-            <a:pPr algn="just"/>
-            <a:r>
-              <a:rPr lang="it-IT" sz="2400" b="1" dirty="0" smtClean="0"/>
-              <a:t>Data </a:t>
-            </a:r>
-            <a:r>
-              <a:rPr lang="it-IT" sz="2400" b="1" dirty="0"/>
-              <a:t>Management </a:t>
-            </a:r>
-            <a:r>
-              <a:rPr lang="it-IT" sz="2400" b="1" dirty="0" err="1"/>
-              <a:t>Layer</a:t>
-            </a:r>
-            <a:r>
-              <a:rPr lang="it-IT" sz="2400" dirty="0"/>
-              <a:t>: lato server, è il </a:t>
-            </a:r>
-            <a:r>
-              <a:rPr lang="it-IT" sz="2400" dirty="0" err="1"/>
-              <a:t>layer</a:t>
-            </a:r>
-            <a:r>
-              <a:rPr lang="it-IT" sz="2400" dirty="0"/>
-              <a:t> che ospita e gestisce le entità persistenti (database e relativo DBMS)</a:t>
-            </a:r>
-            <a:r>
-              <a:rPr lang="it-IT" sz="2400" dirty="0" smtClean="0"/>
-              <a:t>.</a:t>
-            </a:r>
-          </a:p>
-          <a:p>
-            <a:pPr algn="just"/>
-            <a:endParaRPr lang="it-IT" dirty="0"/>
-          </a:p>
-          <a:p>
-            <a:pPr algn="just"/>
-            <a:endParaRPr lang="it-IT" dirty="0"/>
-          </a:p>
-        </p:txBody>
-      </p:sp>
-      <p:sp>
-        <p:nvSpPr>
-          <p:cNvPr id="6" name="Content Placeholder 3"/>
-          <p:cNvSpPr txBox="1">
-            <a:spLocks/>
-          </p:cNvSpPr>
-          <p:nvPr/>
-        </p:nvSpPr>
-        <p:spPr>
-          <a:xfrm>
-            <a:off x="395536" y="5085184"/>
-            <a:ext cx="8496944" cy="1440160"/>
-          </a:xfrm>
-          <a:prstGeom prst="rect">
-            <a:avLst/>
-          </a:prstGeom>
-        </p:spPr>
-        <p:txBody>
-          <a:bodyPr tIns="0"/>
-          <a:lstStyle>
-            <a:lvl1pPr marL="274320" indent="-274320" algn="l" rtl="0" eaLnBrk="1" latinLnBrk="0" hangingPunct="1">
-              <a:spcBef>
-                <a:spcPct val="20000"/>
-              </a:spcBef>
-              <a:buClrTx/>
-              <a:buSzPct val="95000"/>
-              <a:buFont typeface="Wingdings" pitchFamily="2" charset="2"/>
-              <a:buChar char="v"/>
-              <a:defRPr kumimoji="0" sz="2800" kern="1200">
-                <a:solidFill>
-                  <a:schemeClr val="tx1"/>
-                </a:solidFill>
-                <a:latin typeface="+mn-lt"/>
-                <a:ea typeface="+mn-ea"/>
-                <a:cs typeface="+mn-cs"/>
-              </a:defRPr>
-            </a:lvl1pPr>
-            <a:lvl2pPr marL="640080" indent="-246888" algn="l" rtl="0" eaLnBrk="1" latinLnBrk="0" hangingPunct="1">
-              <a:spcBef>
-                <a:spcPct val="20000"/>
-              </a:spcBef>
-              <a:buClrTx/>
-              <a:buSzPct val="85000"/>
-              <a:buFont typeface="Courier New" pitchFamily="49" charset="0"/>
-              <a:buChar char="o"/>
-              <a:defRPr kumimoji="0" sz="2600" kern="1200">
-                <a:solidFill>
-                  <a:schemeClr val="tx1"/>
-                </a:solidFill>
-                <a:latin typeface="+mn-lt"/>
-                <a:ea typeface="+mn-ea"/>
-                <a:cs typeface="+mn-cs"/>
-              </a:defRPr>
-            </a:lvl2pPr>
-            <a:lvl3pPr marL="914400" indent="-246888" algn="l" rtl="0" eaLnBrk="1" latinLnBrk="0" hangingPunct="1">
-              <a:spcBef>
-                <a:spcPct val="20000"/>
-              </a:spcBef>
-              <a:buClrTx/>
-              <a:buSzPct val="70000"/>
-              <a:buFont typeface="Wingdings 2"/>
-              <a:buChar char=""/>
-              <a:defRPr kumimoji="0" sz="2400" kern="1200">
-                <a:solidFill>
-                  <a:schemeClr val="tx1"/>
-                </a:solidFill>
-                <a:latin typeface="+mn-lt"/>
-                <a:ea typeface="+mn-ea"/>
-                <a:cs typeface="+mn-cs"/>
-              </a:defRPr>
-            </a:lvl3pPr>
-            <a:lvl4pPr marL="1188720" indent="-210312" algn="l" rtl="0" eaLnBrk="1" latinLnBrk="0" hangingPunct="1">
-              <a:spcBef>
-                <a:spcPct val="20000"/>
-              </a:spcBef>
-              <a:buClrTx/>
-              <a:buSzPct val="65000"/>
-              <a:buFont typeface="Wingdings 2"/>
-              <a:buChar char=""/>
-              <a:defRPr kumimoji="0" sz="2000" kern="1200">
-                <a:solidFill>
-                  <a:schemeClr val="tx1"/>
-                </a:solidFill>
-                <a:latin typeface="+mn-lt"/>
-                <a:ea typeface="+mn-ea"/>
-                <a:cs typeface="+mn-cs"/>
-              </a:defRPr>
-            </a:lvl4pPr>
-            <a:lvl5pPr marL="1463040" indent="-210312" algn="l" rtl="0" eaLnBrk="1" latinLnBrk="0" hangingPunct="1">
-              <a:spcBef>
-                <a:spcPct val="20000"/>
-              </a:spcBef>
-              <a:buClrTx/>
-              <a:buSzPct val="65000"/>
-              <a:buFont typeface="Wingdings 2"/>
-              <a:buChar char=""/>
-              <a:defRPr kumimoji="0" sz="1800" kern="1200">
-                <a:solidFill>
-                  <a:schemeClr val="tx1"/>
-                </a:solidFill>
-                <a:latin typeface="+mn-lt"/>
-                <a:ea typeface="+mn-ea"/>
-                <a:cs typeface="+mn-cs"/>
-              </a:defRPr>
-            </a:lvl5pPr>
-            <a:lvl6pPr marL="1737360" indent="-210312" algn="l" rtl="0" eaLnBrk="1" latinLnBrk="0" hangingPunct="1">
-              <a:spcBef>
-                <a:spcPct val="20000"/>
-              </a:spcBef>
-              <a:buClr>
-                <a:schemeClr val="accent5"/>
-              </a:buClr>
-              <a:buSzPct val="80000"/>
-              <a:buFont typeface="Wingdings 2"/>
-              <a:buChar char=""/>
-              <a:defRPr kumimoji="0" sz="1800" kern="1200">
-                <a:solidFill>
-                  <a:schemeClr val="tx1"/>
-                </a:solidFill>
-                <a:latin typeface="+mn-lt"/>
-                <a:ea typeface="+mn-ea"/>
-                <a:cs typeface="+mn-cs"/>
-              </a:defRPr>
-            </a:lvl6pPr>
-            <a:lvl7pPr marL="1920240" indent="-182880" algn="l" rtl="0" eaLnBrk="1" latinLnBrk="0" hangingPunct="1">
-              <a:spcBef>
-                <a:spcPct val="20000"/>
-              </a:spcBef>
-              <a:buClr>
-                <a:schemeClr val="accent6"/>
-              </a:buClr>
-              <a:buSzPct val="80000"/>
-              <a:buFont typeface="Wingdings 2"/>
-              <a:buChar char=""/>
-              <a:defRPr kumimoji="0" sz="1600" kern="1200" baseline="0">
-                <a:solidFill>
-                  <a:schemeClr val="tx1"/>
-                </a:solidFill>
-                <a:latin typeface="+mn-lt"/>
-                <a:ea typeface="+mn-ea"/>
-                <a:cs typeface="+mn-cs"/>
-              </a:defRPr>
-            </a:lvl7pPr>
-            <a:lvl8pPr marL="2194560" indent="-182880" algn="l" rtl="0" eaLnBrk="1" latinLnBrk="0" hangingPunct="1">
-              <a:spcBef>
-                <a:spcPct val="20000"/>
-              </a:spcBef>
-              <a:buClr>
-                <a:schemeClr val="tx2"/>
-              </a:buClr>
-              <a:buChar char="•"/>
-              <a:defRPr kumimoji="0" sz="1600" kern="1200">
-                <a:solidFill>
-                  <a:schemeClr val="tx1"/>
-                </a:solidFill>
-                <a:latin typeface="+mn-lt"/>
-                <a:ea typeface="+mn-ea"/>
-                <a:cs typeface="+mn-cs"/>
-              </a:defRPr>
-            </a:lvl8pPr>
-            <a:lvl9pPr marL="2468880" indent="-182880" algn="l" rtl="0" eaLnBrk="1" latinLnBrk="0" hangingPunct="1">
-              <a:spcBef>
-                <a:spcPct val="20000"/>
-              </a:spcBef>
-              <a:buClr>
-                <a:schemeClr val="tx2"/>
-              </a:buClr>
-              <a:buFontTx/>
-              <a:buChar char="•"/>
-              <a:defRPr kumimoji="0" sz="1400" kern="1200" baseline="0">
-                <a:solidFill>
-                  <a:schemeClr val="tx1"/>
-                </a:solidFill>
-                <a:latin typeface="+mn-lt"/>
-                <a:ea typeface="+mn-ea"/>
-                <a:cs typeface="+mn-cs"/>
-              </a:defRPr>
-            </a:lvl9pPr>
-          </a:lstStyle>
-          <a:p>
-            <a:pPr marL="0" indent="0" algn="just">
-              <a:buNone/>
-            </a:pPr>
-            <a:r>
-              <a:rPr lang="it-IT" sz="2400" dirty="0"/>
-              <a:t>La scelta è ricaduta sull'architettura </a:t>
-            </a:r>
-            <a:r>
-              <a:rPr lang="it-IT" sz="2400" dirty="0" err="1"/>
-              <a:t>three-tier</a:t>
-            </a:r>
-            <a:r>
-              <a:rPr lang="it-IT" sz="2400" dirty="0"/>
-              <a:t> allo scopo di gestire con facilità ed indipendentemente i sistemi di elaborazione dati e quelli relativi all'interfaccia grafica (una modifica al livello </a:t>
-            </a:r>
-            <a:r>
-              <a:rPr lang="it-IT" sz="2400" dirty="0" err="1"/>
-              <a:t>presentation</a:t>
-            </a:r>
-            <a:r>
-              <a:rPr lang="it-IT" sz="2400" dirty="0"/>
-              <a:t> non presenterà complicazioni in altri sistemi).</a:t>
-            </a:r>
-          </a:p>
-        </p:txBody>
-      </p:sp>
+      </p:pic>
     </p:spTree>
     <p:extLst>
       <p:ext uri="{BB962C8B-B14F-4D97-AF65-F5344CB8AC3E}">
@@ -8038,8 +7594,8 @@
         </p:nvSpPr>
         <p:spPr>
           <a:xfrm>
-            <a:off x="251520" y="1988840"/>
-            <a:ext cx="8712968" cy="4320480"/>
+            <a:off x="323528" y="2420888"/>
+            <a:ext cx="8712968" cy="2232248"/>
           </a:xfrm>
           <a:prstGeom prst="rect">
             <a:avLst/>
@@ -8224,15 +7780,15 @@
             </a:r>
             <a:r>
               <a:rPr lang="it-IT" dirty="0"/>
-              <a:t>genitore per accedere al sistema deve compilare un </a:t>
-            </a:r>
-            <a:r>
-              <a:rPr lang="it-IT" dirty="0" err="1"/>
-              <a:t>form</a:t>
+              <a:t>sistema deve dare al genitore la sicurezza e l'affidabilità nell'inserimento dei propri dati </a:t>
+            </a:r>
+            <a:r>
+              <a:rPr lang="it-IT" dirty="0" smtClean="0"/>
+              <a:t>sensibili. </a:t>
             </a:r>
             <a:r>
               <a:rPr lang="it-IT" dirty="0"/>
-              <a:t> di registrazione. Il sistema deve dare al genitore la sicurezza e l'affidabilità nell'inserimento dei propri dati sensibili, sia in campo di sicurezza web, sia nel caso del rispetto delle leggi in vigore sulla visibilità e sul trattamento dei dati personali. Qualora le informazioni venissero rese pubbliche, il sistema notifica questo evento al proprietario dei dati </a:t>
+              <a:t>Qualora le informazioni venissero rese pubbliche, il sistema notifica questo evento al proprietario dei dati </a:t>
             </a:r>
             <a:r>
               <a:rPr lang="it-IT" dirty="0" smtClean="0"/>
@@ -9619,8 +9175,21 @@
           <a:p>
             <a:r>
               <a:rPr lang="it-IT" b="1" i="1" dirty="0" smtClean="0"/>
-              <a:t>Cosa è andato male…</a:t>
-            </a:r>
+              <a:t>Cosa </a:t>
+            </a:r>
+            <a:r>
+              <a:rPr lang="it-IT" b="1" i="1" dirty="0" smtClean="0"/>
+              <a:t>stava </a:t>
+            </a:r>
+            <a:r>
+              <a:rPr lang="it-IT" b="1" i="1" smtClean="0"/>
+              <a:t>per andar male</a:t>
+            </a:r>
+            <a:r>
+              <a:rPr lang="it-IT" b="1" i="1" smtClean="0"/>
+              <a:t>…</a:t>
+            </a:r>
+            <a:endParaRPr lang="it-IT" b="1" i="1" dirty="0" smtClean="0"/>
           </a:p>
           <a:p>
             <a:pPr lvl="1"/>
@@ -9742,8 +9311,8 @@
         </p:nvSpPr>
         <p:spPr>
           <a:xfrm>
-            <a:off x="251520" y="1772816"/>
-            <a:ext cx="8712968" cy="4896544"/>
+            <a:off x="251520" y="2420888"/>
+            <a:ext cx="8712968" cy="2880320"/>
           </a:xfrm>
           <a:prstGeom prst="rect">
             <a:avLst/>
@@ -9924,35 +9493,27 @@
             </a:pPr>
             <a:r>
               <a:rPr lang="it-IT" dirty="0" smtClean="0"/>
-              <a:t>Gli </a:t>
+              <a:t>Il </a:t>
             </a:r>
             <a:r>
               <a:rPr lang="it-IT" dirty="0"/>
-              <a:t>utenti del sistema compiono giornalmente delle operazioni. Il sistema si occupa quasi esclusivamente di interrogazioni al </a:t>
+              <a:t>sistema si occupa quasi esclusivamente di interrogazioni al </a:t>
             </a:r>
             <a:r>
               <a:rPr lang="it-IT" dirty="0" smtClean="0"/>
-              <a:t>database; </a:t>
+              <a:t>database. Il </a:t>
             </a:r>
             <a:r>
               <a:rPr lang="it-IT" dirty="0"/>
-              <a:t>i genitori, quindi, consultano e modificano gli elenchi, dopo aver eseguito operazioni di login. Questo tipo di </a:t>
+              <a:t>tempo di </a:t>
             </a:r>
             <a:r>
               <a:rPr lang="it-IT" dirty="0" smtClean="0"/>
-              <a:t>operazioni, </a:t>
+              <a:t>attesa richiesto per la gestione delle informazioni </a:t>
             </a:r>
             <a:r>
               <a:rPr lang="it-IT" dirty="0"/>
-              <a:t>seppur oneroso per il database di grande dimensioni, non può quindi occupare più di qualche secondo per produrre risultati. I</a:t>
-            </a:r>
-            <a:r>
-              <a:rPr lang="it-IT" dirty="0" smtClean="0"/>
-              <a:t>l </a:t>
-            </a:r>
-            <a:r>
-              <a:rPr lang="it-IT" dirty="0"/>
-              <a:t>tempo di attese dei genitori è di pochi secondi. Il sistema deve permettere al genitore di poter avere conferma dell'avvenuta iscrizione in non più di </a:t>
+              <a:t>è di pochi secondi. Il sistema deve permettere al genitore di poter avere conferma dell'avvenuta iscrizione in non più di </a:t>
             </a:r>
             <a:r>
               <a:rPr lang="it-IT" dirty="0" smtClean="0"/>
@@ -10072,8 +9633,8 @@
         </p:nvSpPr>
         <p:spPr>
           <a:xfrm>
-            <a:off x="251520" y="1772816"/>
-            <a:ext cx="8712968" cy="4896544"/>
+            <a:off x="251520" y="2132856"/>
+            <a:ext cx="8712968" cy="3090435"/>
           </a:xfrm>
           <a:prstGeom prst="rect">
             <a:avLst/>
@@ -10253,16 +9814,20 @@
               <a:buNone/>
             </a:pPr>
             <a:r>
+              <a:rPr lang="it-IT" dirty="0" smtClean="0"/>
+              <a:t>L'interfaccia </a:t>
+            </a:r>
+            <a:r>
               <a:rPr lang="it-IT" dirty="0"/>
-              <a:t>Il genitore è uno di quegli </a:t>
-            </a:r>
-            <a:r>
-              <a:rPr lang="it-IT" dirty="0" err="1"/>
-              <a:t>stakeholders</a:t>
+              <a:t>con cui il genitore ha un'interazione con il </a:t>
+            </a:r>
+            <a:r>
+              <a:rPr lang="it-IT" dirty="0" smtClean="0"/>
+              <a:t>sistema dovrà </a:t>
             </a:r>
             <a:r>
               <a:rPr lang="it-IT" dirty="0"/>
-              <a:t> del sistema “At-Silo” che ha le maggiori difficoltà nell'utilizzo del sistema informatico. L'interfaccia con cui il genitore ha un'interazione con il sistema, dovrà fare un massiccio uso di metafore, permettendo di eseguire </a:t>
+              <a:t>fare un massiccio uso di metafore, permettendo di eseguire </a:t>
             </a:r>
             <a:r>
               <a:rPr lang="it-IT" dirty="0" smtClean="0"/>
@@ -10274,27 +9839,11 @@
             </a:r>
             <a:r>
               <a:rPr lang="it-IT" dirty="0" smtClean="0"/>
-              <a:t>precedentemente già inseriti e quindi già noti al sistema. </a:t>
-            </a:r>
-            <a:r>
-              <a:rPr lang="it-IT" dirty="0"/>
-              <a:t>Questo requisito è fondamentale per permettere al genitore di eseguire </a:t>
+              <a:t>precedentemente già inseriti e quindi già noti al </a:t>
             </a:r>
             <a:r>
               <a:rPr lang="it-IT" dirty="0" smtClean="0"/>
-              <a:t>operazioni </a:t>
-            </a:r>
-            <a:r>
-              <a:rPr lang="it-IT" dirty="0"/>
-              <a:t>con maggiore </a:t>
-            </a:r>
-            <a:r>
-              <a:rPr lang="it-IT" dirty="0" smtClean="0"/>
-              <a:t>voglia e facilità ed </a:t>
-            </a:r>
-            <a:r>
-              <a:rPr lang="it-IT" dirty="0"/>
-              <a:t>in maniera più accurata e precisa.</a:t>
+              <a:t>sistema</a:t>
             </a:r>
             <a:endParaRPr lang="it-IT" dirty="0" smtClean="0"/>
           </a:p>
@@ -11013,7 +10562,7 @@
         </p:nvSpPr>
         <p:spPr>
           <a:xfrm>
-            <a:off x="251520" y="2204864"/>
+            <a:off x="251520" y="2420888"/>
             <a:ext cx="8712968" cy="3312368"/>
           </a:xfrm>
           <a:prstGeom prst="rect">
@@ -11214,8 +10763,16 @@
               <a:t>sistema, </a:t>
             </a:r>
             <a:r>
+              <a:rPr lang="it-IT" dirty="0" smtClean="0"/>
+              <a:t>dev’essere</a:t>
+            </a:r>
+            <a:r>
+              <a:rPr lang="it-IT" dirty="0" smtClean="0"/>
+              <a:t> </a:t>
+            </a:r>
+            <a:r>
               <a:rPr lang="it-IT" dirty="0"/>
-              <a:t>essendo progettato per essere eseguito su macchine diverse e utilizzato anche tramite browser, è scalabile ed adattabile a nuovi sviluppi hardware e software.</a:t>
+              <a:t>scalabile ed adattabile a nuovi sviluppi hardware e software.</a:t>
             </a:r>
           </a:p>
         </p:txBody>
@@ -11331,8 +10888,8 @@
         </p:nvSpPr>
         <p:spPr>
           <a:xfrm>
-            <a:off x="251520" y="2204864"/>
-            <a:ext cx="8712968" cy="4104456"/>
+            <a:off x="251520" y="2492896"/>
+            <a:ext cx="8712968" cy="1872208"/>
           </a:xfrm>
           <a:prstGeom prst="rect">
             <a:avLst/>
@@ -11517,19 +11074,15 @@
             </a:r>
             <a:r>
               <a:rPr lang="it-IT" dirty="0" smtClean="0"/>
-              <a:t>personale amministrativo potrà </a:t>
+              <a:t>personale amministrativo </a:t>
+            </a:r>
+            <a:r>
+              <a:rPr lang="it-IT" dirty="0" smtClean="0"/>
+              <a:t>può </a:t>
             </a:r>
             <a:r>
               <a:rPr lang="it-IT" dirty="0"/>
               <a:t>facilmente e velocemente apprendere il funzionamento del sistema. </a:t>
-            </a:r>
-            <a:r>
-              <a:rPr lang="it-IT" dirty="0" smtClean="0"/>
-              <a:t>Il personale deve </a:t>
-            </a:r>
-            <a:r>
-              <a:rPr lang="it-IT" dirty="0"/>
-              <a:t>poter effettuare vari operazioni come la visualizzazione delle risposte dei genitori ai questionari valutativi in meno otto click.</a:t>
             </a:r>
           </a:p>
         </p:txBody>
@@ -11645,8 +11198,8 @@
         </p:nvSpPr>
         <p:spPr>
           <a:xfrm>
-            <a:off x="251520" y="1667538"/>
-            <a:ext cx="8712968" cy="5157192"/>
+            <a:off x="251520" y="1916832"/>
+            <a:ext cx="8712968" cy="3849694"/>
           </a:xfrm>
           <a:prstGeom prst="rect">
             <a:avLst/>
@@ -11826,40 +11379,56 @@
               <a:buNone/>
             </a:pPr>
             <a:r>
-              <a:rPr lang="it-IT" dirty="0"/>
-              <a:t>In caso di scadenze burocratiche come la scadenza del bando dell'iscrizione </a:t>
-            </a:r>
-            <a:r>
-              <a:rPr lang="it-IT" dirty="0" smtClean="0"/>
-              <a:t>all'asilo e </a:t>
-            </a:r>
-            <a:r>
-              <a:rPr lang="it-IT" dirty="0"/>
-              <a:t>la sua gestione, la pubblicazione della relativa </a:t>
-            </a:r>
-            <a:r>
-              <a:rPr lang="it-IT" dirty="0" smtClean="0"/>
-              <a:t>graduatoria, </a:t>
-            </a:r>
-            <a:r>
-              <a:rPr lang="it-IT" dirty="0"/>
-              <a:t>il sistema deve sempre funzionare ed essere disponibile evitando cosi l'impossibilità ad effettuare questo tipo di operazioni. </a:t>
-            </a:r>
-            <a:r>
               <a:rPr lang="it-IT" dirty="0" smtClean="0"/>
               <a:t>Il sistema </a:t>
             </a:r>
             <a:r>
               <a:rPr lang="it-IT" dirty="0"/>
-              <a:t>non deve essere soggetto a fallimento ma essere tollerante agli errori prevenendo quelli che fanno riferimento ad inserimento di dati necessari alla compilazione corretta di un </a:t>
-            </a:r>
-            <a:r>
-              <a:rPr lang="it-IT" dirty="0" err="1"/>
-              <a:t>form</a:t>
+              <a:t>deve sempre funzionare ed essere disponibile </a:t>
+            </a:r>
+            <a:r>
+              <a:rPr lang="it-IT" dirty="0" smtClean="0"/>
+              <a:t>evitando </a:t>
             </a:r>
             <a:r>
               <a:rPr lang="it-IT" dirty="0"/>
-              <a:t>, perdita di connessione al database, perdita di connessione alla </a:t>
+              <a:t>l'impossibilità ad effettuare </a:t>
+            </a:r>
+            <a:r>
+              <a:rPr lang="it-IT" dirty="0" smtClean="0"/>
+              <a:t>operazioni come la gestione delle iscrizion</a:t>
+            </a:r>
+            <a:r>
+              <a:rPr lang="it-IT" dirty="0" smtClean="0"/>
+              <a:t>i e la pubblicazione delle graduatorie</a:t>
+            </a:r>
+            <a:r>
+              <a:rPr lang="it-IT" dirty="0" smtClean="0"/>
+              <a:t>. </a:t>
+            </a:r>
+            <a:r>
+              <a:rPr lang="it-IT" dirty="0" smtClean="0"/>
+              <a:t>Il sistema </a:t>
+            </a:r>
+            <a:r>
+              <a:rPr lang="it-IT" dirty="0"/>
+              <a:t>non deve essere soggetto a fallimento ma essere tollerante agli errori </a:t>
+            </a:r>
+            <a:r>
+              <a:rPr lang="it-IT" dirty="0" smtClean="0"/>
+              <a:t>di inserimento </a:t>
+            </a:r>
+            <a:r>
+              <a:rPr lang="it-IT" dirty="0"/>
+              <a:t>di </a:t>
+            </a:r>
+            <a:r>
+              <a:rPr lang="it-IT" dirty="0" smtClean="0"/>
+              <a:t>dati, </a:t>
+            </a:r>
+            <a:r>
+              <a:rPr lang="it-IT" dirty="0"/>
+              <a:t>perdita di connessione al database, perdita di connessione alla </a:t>
             </a:r>
             <a:r>
               <a:rPr lang="it-IT" dirty="0" smtClean="0"/>
@@ -11871,7 +11440,7 @@
             </a:r>
             <a:r>
               <a:rPr lang="it-IT" dirty="0" smtClean="0"/>
-              <a:t>notificando l’utente.</a:t>
+              <a:t>e deve notificare l’utente.</a:t>
             </a:r>
             <a:endParaRPr lang="it-IT" dirty="0"/>
           </a:p>

</xml_diff>

<commit_message>
[WR A] Presentazione riadattata
</commit_message>
<xml_diff>
--- a/Presentazione/Atsilo1/Micco/Atsilo_A_Micco.pptx
+++ b/Presentazione/Atsilo1/Micco/Atsilo_A_Micco.pptx
@@ -214,7 +214,7 @@
           <a:p>
             <a:fld id="{38D78F4D-402C-46E0-A4BB-DF91EA86B14C}" type="datetimeFigureOut">
               <a:rPr lang="it-IT" smtClean="0"/>
-              <a:t>28/12/12</a:t>
+              <a:t>29/12/12</a:t>
             </a:fld>
             <a:endParaRPr lang="it-IT"/>
           </a:p>
@@ -647,7 +647,7 @@
           <a:p>
             <a:fld id="{63CABBC0-75E4-43BB-A6A6-84C2A96BDB82}" type="datetimeFigureOut">
               <a:rPr lang="it-IT" smtClean="0"/>
-              <a:t>28/12/12</a:t>
+              <a:t>29/12/12</a:t>
             </a:fld>
             <a:endParaRPr lang="it-IT"/>
           </a:p>
@@ -827,7 +827,7 @@
           <a:p>
             <a:fld id="{63CABBC0-75E4-43BB-A6A6-84C2A96BDB82}" type="datetimeFigureOut">
               <a:rPr lang="it-IT" smtClean="0"/>
-              <a:t>28/12/12</a:t>
+              <a:t>29/12/12</a:t>
             </a:fld>
             <a:endParaRPr lang="it-IT"/>
           </a:p>
@@ -1017,7 +1017,7 @@
           <a:p>
             <a:fld id="{63CABBC0-75E4-43BB-A6A6-84C2A96BDB82}" type="datetimeFigureOut">
               <a:rPr lang="it-IT" smtClean="0"/>
-              <a:t>28/12/12</a:t>
+              <a:t>29/12/12</a:t>
             </a:fld>
             <a:endParaRPr lang="it-IT"/>
           </a:p>
@@ -1197,7 +1197,7 @@
           <a:p>
             <a:fld id="{63CABBC0-75E4-43BB-A6A6-84C2A96BDB82}" type="datetimeFigureOut">
               <a:rPr lang="it-IT" smtClean="0"/>
-              <a:t>28/12/12</a:t>
+              <a:t>29/12/12</a:t>
             </a:fld>
             <a:endParaRPr lang="it-IT"/>
           </a:p>
@@ -1438,7 +1438,7 @@
           <a:p>
             <a:fld id="{63CABBC0-75E4-43BB-A6A6-84C2A96BDB82}" type="datetimeFigureOut">
               <a:rPr lang="it-IT" smtClean="0"/>
-              <a:t>28/12/12</a:t>
+              <a:t>29/12/12</a:t>
             </a:fld>
             <a:endParaRPr lang="it-IT"/>
           </a:p>
@@ -1717,7 +1717,7 @@
           <a:p>
             <a:fld id="{63CABBC0-75E4-43BB-A6A6-84C2A96BDB82}" type="datetimeFigureOut">
               <a:rPr lang="it-IT" smtClean="0"/>
-              <a:t>28/12/12</a:t>
+              <a:t>29/12/12</a:t>
             </a:fld>
             <a:endParaRPr lang="it-IT"/>
           </a:p>
@@ -2106,7 +2106,7 @@
           <a:p>
             <a:fld id="{63CABBC0-75E4-43BB-A6A6-84C2A96BDB82}" type="datetimeFigureOut">
               <a:rPr lang="it-IT" smtClean="0"/>
-              <a:t>28/12/12</a:t>
+              <a:t>29/12/12</a:t>
             </a:fld>
             <a:endParaRPr lang="it-IT"/>
           </a:p>
@@ -2263,7 +2263,7 @@
           <a:p>
             <a:fld id="{63CABBC0-75E4-43BB-A6A6-84C2A96BDB82}" type="datetimeFigureOut">
               <a:rPr lang="it-IT" smtClean="0"/>
-              <a:t>28/12/12</a:t>
+              <a:t>29/12/12</a:t>
             </a:fld>
             <a:endParaRPr lang="it-IT"/>
           </a:p>
@@ -2360,7 +2360,7 @@
           <a:p>
             <a:fld id="{63CABBC0-75E4-43BB-A6A6-84C2A96BDB82}" type="datetimeFigureOut">
               <a:rPr lang="it-IT" smtClean="0"/>
-              <a:t>28/12/12</a:t>
+              <a:t>29/12/12</a:t>
             </a:fld>
             <a:endParaRPr lang="it-IT"/>
           </a:p>
@@ -2628,7 +2628,7 @@
           <a:p>
             <a:fld id="{63CABBC0-75E4-43BB-A6A6-84C2A96BDB82}" type="datetimeFigureOut">
               <a:rPr lang="it-IT" smtClean="0"/>
-              <a:t>28/12/12</a:t>
+              <a:t>29/12/12</a:t>
             </a:fld>
             <a:endParaRPr lang="it-IT"/>
           </a:p>
@@ -2923,7 +2923,7 @@
           <a:p>
             <a:fld id="{63CABBC0-75E4-43BB-A6A6-84C2A96BDB82}" type="datetimeFigureOut">
               <a:rPr lang="it-IT" smtClean="0"/>
-              <a:t>28/12/12</a:t>
+              <a:t>29/12/12</a:t>
             </a:fld>
             <a:endParaRPr lang="it-IT"/>
           </a:p>
@@ -3701,7 +3701,7 @@
           <a:p>
             <a:fld id="{63CABBC0-75E4-43BB-A6A6-84C2A96BDB82}" type="datetimeFigureOut">
               <a:rPr lang="it-IT" smtClean="0"/>
-              <a:t>28/12/12</a:t>
+              <a:t>29/12/12</a:t>
             </a:fld>
             <a:endParaRPr lang="it-IT"/>
           </a:p>
@@ -5320,8 +5320,8 @@
         </p:nvSpPr>
         <p:spPr>
           <a:xfrm>
-            <a:off x="323528" y="1988840"/>
-            <a:ext cx="8208912" cy="3528392"/>
+            <a:off x="323528" y="2492896"/>
+            <a:ext cx="8208912" cy="2160240"/>
           </a:xfrm>
           <a:prstGeom prst="rect">
             <a:avLst/>
@@ -5511,15 +5511,7 @@
             </a:pPr>
             <a:r>
               <a:rPr lang="it-IT" dirty="0"/>
-              <a:t>L’interfaccia del prodotto At-silo è composta da oggetti molto comprensibili all’utente che vanno a chiarire immediatamente la propria funzione. L’interfaccia è composta da schede, pulsanti e varie etichette, associate all’oggetto, che fanno intendere la loro utilità. Sono altresì presenti vari </a:t>
-            </a:r>
-            <a:r>
-              <a:rPr lang="it-IT" dirty="0" err="1"/>
-              <a:t>tooltip</a:t>
-            </a:r>
-            <a:r>
-              <a:rPr lang="it-IT" dirty="0"/>
-              <a:t> che aiutano l'utente nell'interazione col sistema.	</a:t>
+              <a:t>L’interfaccia del prodotto At-silo è composta da oggetti molto comprensibili all’utente che vanno a chiarire immediatamente la propria funzione. </a:t>
             </a:r>
           </a:p>
         </p:txBody>
@@ -5811,7 +5803,51 @@
             </a:pPr>
             <a:r>
               <a:rPr lang="it-IT" dirty="0"/>
-              <a:t>La gestione della sicurezza viene affidata all’utilizzo del login iniziale in quanto va ad autenticare l’utente al quale sarà visualizzata solo la parte del sistema a cui è abilitato, evitando così incongruenze di dati. Questa politica di permessi, permette di non appesantire eccessivamente il software ed è un buon compromesso tra sicurezza ed efficienza.</a:t>
+              <a:t>La gestione della sicurezza </a:t>
+            </a:r>
+            <a:r>
+              <a:rPr lang="it-IT" dirty="0"/>
+              <a:t>è</a:t>
+            </a:r>
+            <a:r>
+              <a:rPr lang="it-IT" dirty="0" smtClean="0"/>
+              <a:t> </a:t>
+            </a:r>
+            <a:r>
+              <a:rPr lang="it-IT" dirty="0"/>
+              <a:t>affidata </a:t>
+            </a:r>
+            <a:r>
+              <a:rPr lang="it-IT" dirty="0" smtClean="0"/>
+              <a:t>al login </a:t>
+            </a:r>
+            <a:r>
+              <a:rPr lang="it-IT" dirty="0"/>
+              <a:t>iniziale in quanto </a:t>
+            </a:r>
+            <a:r>
+              <a:rPr lang="it-IT" dirty="0" smtClean="0"/>
+              <a:t>autentica l’utente </a:t>
+            </a:r>
+            <a:r>
+              <a:rPr lang="it-IT" dirty="0"/>
+              <a:t>al quale sarà </a:t>
+            </a:r>
+            <a:r>
+              <a:rPr lang="it-IT" dirty="0" smtClean="0"/>
+              <a:t>visualizzata </a:t>
+            </a:r>
+            <a:r>
+              <a:rPr lang="it-IT" dirty="0"/>
+              <a:t>solo la parte del sistema a cui è </a:t>
+            </a:r>
+            <a:r>
+              <a:rPr lang="it-IT" dirty="0" smtClean="0"/>
+              <a:t>abilitato. Questa politica di permessi non appesantisce  </a:t>
+            </a:r>
+            <a:r>
+              <a:rPr lang="it-IT" dirty="0"/>
+              <a:t>eccessivamente il software ed è un buon compromesso tra sicurezza ed efficienza.</a:t>
             </a:r>
           </a:p>
         </p:txBody>
@@ -5912,8 +5948,8 @@
         </p:nvSpPr>
         <p:spPr>
           <a:xfrm>
-            <a:off x="251520" y="1556792"/>
-            <a:ext cx="8640960" cy="4869160"/>
+            <a:off x="251520" y="1988840"/>
+            <a:ext cx="8640960" cy="3312368"/>
           </a:xfrm>
           <a:prstGeom prst="rect">
             <a:avLst/>
@@ -6115,25 +6151,16 @@
             </a:r>
             <a:r>
               <a:rPr lang="it-IT" dirty="0" smtClean="0"/>
-              <a:t>riscontrate</a:t>
+              <a:t>riscontrate; il </a:t>
+            </a:r>
+            <a:r>
+              <a:rPr lang="it-IT" dirty="0"/>
+              <a:t>carico complessivo dei dati non influirà sulla velocità del </a:t>
             </a:r>
             <a:r>
               <a:rPr lang="it-IT" dirty="0" smtClean="0"/>
-              <a:t>; </a:t>
-            </a:r>
-            <a:r>
-              <a:rPr lang="it-IT" dirty="0" smtClean="0"/>
-              <a:t>il </a:t>
-            </a:r>
-            <a:r>
-              <a:rPr lang="it-IT" dirty="0"/>
-              <a:t>carico complessivo dei dati non influirà sulla velocità del sistema. Oltre modo le operazioni delle funzionalità implementate richiederanno un brevissimo tempo di </a:t>
-            </a:r>
-            <a:r>
-              <a:rPr lang="it-IT" dirty="0" smtClean="0"/>
-              <a:t>risposta. </a:t>
-            </a:r>
-            <a:endParaRPr lang="it-IT" dirty="0" smtClean="0"/>
+              <a:t>sistema</a:t>
+            </a:r>
           </a:p>
           <a:p>
             <a:pPr marL="0" indent="0" algn="just">
@@ -6145,7 +6172,15 @@
             </a:r>
             <a:r>
               <a:rPr lang="it-IT" dirty="0"/>
-              <a:t>è scelto di dare più rilevanza alla velocità rispetto che allo spazio. La scelta di un DBMS rispecchia questa decisione in quanto i dati persistenti richiedono più spazio sul disco ma la velocità in lettura e in scrittura è molto alta.</a:t>
+              <a:t>è scelto di dare più rilevanza alla velocità rispetto che allo spazio. </a:t>
+            </a:r>
+            <a:r>
+              <a:rPr lang="it-IT" dirty="0" smtClean="0"/>
+              <a:t>I dati </a:t>
+            </a:r>
+            <a:r>
+              <a:rPr lang="it-IT" dirty="0"/>
+              <a:t>persistenti richiedono più spazio sul disco ma la velocità in lettura e in scrittura è molto alta.</a:t>
             </a:r>
           </a:p>
         </p:txBody>
@@ -6246,7 +6281,7 @@
         </p:nvSpPr>
         <p:spPr>
           <a:xfrm>
-            <a:off x="251520" y="1844824"/>
+            <a:off x="251520" y="2060848"/>
             <a:ext cx="8640960" cy="2448272"/>
           </a:xfrm>
           <a:prstGeom prst="rect">
@@ -9175,19 +9210,11 @@
           <a:p>
             <a:r>
               <a:rPr lang="it-IT" b="1" i="1" dirty="0" smtClean="0"/>
-              <a:t>Cosa </a:t>
-            </a:r>
-            <a:r>
-              <a:rPr lang="it-IT" b="1" i="1" dirty="0" smtClean="0"/>
-              <a:t>stava </a:t>
+              <a:t>Cosa stava </a:t>
             </a:r>
             <a:r>
               <a:rPr lang="it-IT" b="1" i="1" smtClean="0"/>
-              <a:t>per andar male</a:t>
-            </a:r>
-            <a:r>
-              <a:rPr lang="it-IT" b="1" i="1" smtClean="0"/>
-              <a:t>…</a:t>
+              <a:t>per andar male…</a:t>
             </a:r>
             <a:endParaRPr lang="it-IT" b="1" i="1" dirty="0" smtClean="0"/>
           </a:p>
@@ -9513,12 +9540,9 @@
             </a:r>
             <a:r>
               <a:rPr lang="it-IT" dirty="0"/>
-              <a:t>è di pochi secondi. Il sistema deve permettere al genitore di poter avere conferma dell'avvenuta iscrizione in non più di </a:t>
-            </a:r>
-            <a:r>
-              <a:rPr lang="it-IT" dirty="0" smtClean="0"/>
-              <a:t>5 secondi.</a:t>
-            </a:r>
+              <a:t>è di pochi secondi. </a:t>
+            </a:r>
+            <a:endParaRPr lang="it-IT" dirty="0" smtClean="0"/>
           </a:p>
         </p:txBody>
       </p:sp>
@@ -9839,13 +9863,8 @@
             </a:r>
             <a:r>
               <a:rPr lang="it-IT" dirty="0" smtClean="0"/>
-              <a:t>precedentemente già inseriti e quindi già noti al </a:t>
-            </a:r>
-            <a:r>
-              <a:rPr lang="it-IT" dirty="0" smtClean="0"/>
-              <a:t>sistema</a:t>
-            </a:r>
-            <a:endParaRPr lang="it-IT" dirty="0" smtClean="0"/>
+              <a:t>precedentemente già inseriti e quindi già noti al sistema</a:t>
+            </a:r>
           </a:p>
         </p:txBody>
       </p:sp>
@@ -9960,8 +9979,8 @@
         </p:nvSpPr>
         <p:spPr>
           <a:xfrm>
-            <a:off x="251520" y="2276872"/>
-            <a:ext cx="8712968" cy="4896544"/>
+            <a:off x="251520" y="2564904"/>
+            <a:ext cx="8712968" cy="2376264"/>
           </a:xfrm>
           <a:prstGeom prst="rect">
             <a:avLst/>
@@ -10142,7 +10161,23 @@
             </a:pPr>
             <a:r>
               <a:rPr lang="it-IT" dirty="0"/>
-              <a:t>I genitori che accedono ad “At-Silo” fanno uso di un browser, che permette la navigazione tra i vari contenuti del sistema. Indipendentemente dal browser e dal sistema utilizzato dai genitori, il sistema deve essere funzionante e coerente con il design modellato.</a:t>
+              <a:t>I genitori che accedono ad “At-Silo” fanno uso di un browser, che permette la navigazione tra i vari contenuti del sistema. </a:t>
+            </a:r>
+            <a:r>
+              <a:rPr lang="it-IT" dirty="0" smtClean="0"/>
+              <a:t>Il sistema </a:t>
+            </a:r>
+            <a:r>
+              <a:rPr lang="it-IT" dirty="0"/>
+              <a:t>deve essere </a:t>
+            </a:r>
+            <a:r>
+              <a:rPr lang="it-IT" dirty="0" smtClean="0"/>
+              <a:t>sempre funzionante </a:t>
+            </a:r>
+            <a:r>
+              <a:rPr lang="it-IT" dirty="0"/>
+              <a:t>e coerente con il design modellato.</a:t>
             </a:r>
             <a:endParaRPr lang="it-IT" dirty="0" smtClean="0"/>
           </a:p>
@@ -10760,15 +10795,7 @@
             </a:r>
             <a:r>
               <a:rPr lang="it-IT" dirty="0" smtClean="0"/>
-              <a:t>sistema, </a:t>
-            </a:r>
-            <a:r>
-              <a:rPr lang="it-IT" dirty="0" smtClean="0"/>
-              <a:t>dev’essere</a:t>
-            </a:r>
-            <a:r>
-              <a:rPr lang="it-IT" dirty="0" smtClean="0"/>
-              <a:t> </a:t>
+              <a:t>sistema, dev’essere </a:t>
             </a:r>
             <a:r>
               <a:rPr lang="it-IT" dirty="0"/>
@@ -11074,11 +11101,7 @@
             </a:r>
             <a:r>
               <a:rPr lang="it-IT" dirty="0" smtClean="0"/>
-              <a:t>personale amministrativo </a:t>
-            </a:r>
-            <a:r>
-              <a:rPr lang="it-IT" dirty="0" smtClean="0"/>
-              <a:t>può </a:t>
+              <a:t>personale amministrativo può </a:t>
             </a:r>
             <a:r>
               <a:rPr lang="it-IT" dirty="0"/>
@@ -11198,8 +11221,8 @@
         </p:nvSpPr>
         <p:spPr>
           <a:xfrm>
-            <a:off x="251520" y="1916832"/>
-            <a:ext cx="8712968" cy="3849694"/>
+            <a:off x="251520" y="2492896"/>
+            <a:ext cx="8712968" cy="2520280"/>
           </a:xfrm>
           <a:prstGeom prst="rect">
             <a:avLst/>
@@ -11396,23 +11419,23 @@
             </a:r>
             <a:r>
               <a:rPr lang="it-IT" dirty="0" smtClean="0"/>
-              <a:t>operazioni come la gestione delle iscrizion</a:t>
+              <a:t>operazioni </a:t>
             </a:r>
             <a:r>
               <a:rPr lang="it-IT" dirty="0" smtClean="0"/>
-              <a:t>i e la pubblicazione delle graduatorie</a:t>
-            </a:r>
-            <a:r>
-              <a:rPr lang="it-IT" dirty="0" smtClean="0"/>
-              <a:t>. </a:t>
+              <a:t>gestionali. </a:t>
             </a:r>
             <a:r>
               <a:rPr lang="it-IT" dirty="0" smtClean="0"/>
               <a:t>Il sistema </a:t>
             </a:r>
             <a:r>
+              <a:rPr lang="it-IT" dirty="0" smtClean="0"/>
+              <a:t>deve essere </a:t>
+            </a:r>
+            <a:r>
               <a:rPr lang="it-IT" dirty="0"/>
-              <a:t>non deve essere soggetto a fallimento ma essere tollerante agli errori </a:t>
+              <a:t>tollerante agli errori </a:t>
             </a:r>
             <a:r>
               <a:rPr lang="it-IT" dirty="0" smtClean="0"/>
@@ -11428,15 +11451,11 @@
             </a:r>
             <a:r>
               <a:rPr lang="it-IT" dirty="0"/>
-              <a:t>perdita di connessione al database, perdita di connessione alla </a:t>
+              <a:t>perdita </a:t>
             </a:r>
             <a:r>
               <a:rPr lang="it-IT" dirty="0" smtClean="0"/>
-              <a:t>rete (</a:t>
-            </a:r>
-            <a:r>
-              <a:rPr lang="it-IT" dirty="0"/>
-              <a:t>Internet), </a:t>
+              <a:t>di connessione, </a:t>
             </a:r>
             <a:r>
               <a:rPr lang="it-IT" dirty="0" smtClean="0"/>

</xml_diff>